<commit_message>
fix class to function
</commit_message>
<xml_diff>
--- a/UI.pptx
+++ b/UI.pptx
@@ -6,6 +6,7 @@
   </p:sldMasterIdLst>
   <p:sldIdLst>
     <p:sldId id="256" r:id="rId2"/>
+    <p:sldId id="257" r:id="rId3"/>
   </p:sldIdLst>
   <p:sldSz cx="12192000" cy="6858000"/>
   <p:notesSz cx="6858000" cy="9144000"/>
@@ -104,6 +105,11 @@
       </a:defRPr>
     </a:lvl9pPr>
   </p:defaultTextStyle>
+  <p:extLst>
+    <p:ext uri="{EFAFB233-063F-42B5-8137-9DF3F51BA10A}">
+      <p15:sldGuideLst xmlns:p15="http://schemas.microsoft.com/office/powerpoint/2012/main"/>
+    </p:ext>
+  </p:extLst>
 </p:presentation>
 </file>
 
@@ -254,7 +260,7 @@
           <a:p>
             <a:fld id="{B2C9DBA1-8D4A-4E57-AA66-EB41DF1E3A11}" type="datetimeFigureOut">
               <a:rPr lang="ko-KR" altLang="en-US" smtClean="0"/>
-              <a:t>2021-03-18</a:t>
+              <a:t>2021-03-23</a:t>
             </a:fld>
             <a:endParaRPr lang="ko-KR" altLang="en-US"/>
           </a:p>
@@ -452,7 +458,7 @@
           <a:p>
             <a:fld id="{B2C9DBA1-8D4A-4E57-AA66-EB41DF1E3A11}" type="datetimeFigureOut">
               <a:rPr lang="ko-KR" altLang="en-US" smtClean="0"/>
-              <a:t>2021-03-18</a:t>
+              <a:t>2021-03-23</a:t>
             </a:fld>
             <a:endParaRPr lang="ko-KR" altLang="en-US"/>
           </a:p>
@@ -660,7 +666,7 @@
           <a:p>
             <a:fld id="{B2C9DBA1-8D4A-4E57-AA66-EB41DF1E3A11}" type="datetimeFigureOut">
               <a:rPr lang="ko-KR" altLang="en-US" smtClean="0"/>
-              <a:t>2021-03-18</a:t>
+              <a:t>2021-03-23</a:t>
             </a:fld>
             <a:endParaRPr lang="ko-KR" altLang="en-US"/>
           </a:p>
@@ -858,7 +864,7 @@
           <a:p>
             <a:fld id="{B2C9DBA1-8D4A-4E57-AA66-EB41DF1E3A11}" type="datetimeFigureOut">
               <a:rPr lang="ko-KR" altLang="en-US" smtClean="0"/>
-              <a:t>2021-03-18</a:t>
+              <a:t>2021-03-23</a:t>
             </a:fld>
             <a:endParaRPr lang="ko-KR" altLang="en-US"/>
           </a:p>
@@ -1133,7 +1139,7 @@
           <a:p>
             <a:fld id="{B2C9DBA1-8D4A-4E57-AA66-EB41DF1E3A11}" type="datetimeFigureOut">
               <a:rPr lang="ko-KR" altLang="en-US" smtClean="0"/>
-              <a:t>2021-03-18</a:t>
+              <a:t>2021-03-23</a:t>
             </a:fld>
             <a:endParaRPr lang="ko-KR" altLang="en-US"/>
           </a:p>
@@ -1398,7 +1404,7 @@
           <a:p>
             <a:fld id="{B2C9DBA1-8D4A-4E57-AA66-EB41DF1E3A11}" type="datetimeFigureOut">
               <a:rPr lang="ko-KR" altLang="en-US" smtClean="0"/>
-              <a:t>2021-03-18</a:t>
+              <a:t>2021-03-23</a:t>
             </a:fld>
             <a:endParaRPr lang="ko-KR" altLang="en-US"/>
           </a:p>
@@ -1810,7 +1816,7 @@
           <a:p>
             <a:fld id="{B2C9DBA1-8D4A-4E57-AA66-EB41DF1E3A11}" type="datetimeFigureOut">
               <a:rPr lang="ko-KR" altLang="en-US" smtClean="0"/>
-              <a:t>2021-03-18</a:t>
+              <a:t>2021-03-23</a:t>
             </a:fld>
             <a:endParaRPr lang="ko-KR" altLang="en-US"/>
           </a:p>
@@ -1951,7 +1957,7 @@
           <a:p>
             <a:fld id="{B2C9DBA1-8D4A-4E57-AA66-EB41DF1E3A11}" type="datetimeFigureOut">
               <a:rPr lang="ko-KR" altLang="en-US" smtClean="0"/>
-              <a:t>2021-03-18</a:t>
+              <a:t>2021-03-23</a:t>
             </a:fld>
             <a:endParaRPr lang="ko-KR" altLang="en-US"/>
           </a:p>
@@ -2064,7 +2070,7 @@
           <a:p>
             <a:fld id="{B2C9DBA1-8D4A-4E57-AA66-EB41DF1E3A11}" type="datetimeFigureOut">
               <a:rPr lang="ko-KR" altLang="en-US" smtClean="0"/>
-              <a:t>2021-03-18</a:t>
+              <a:t>2021-03-23</a:t>
             </a:fld>
             <a:endParaRPr lang="ko-KR" altLang="en-US"/>
           </a:p>
@@ -2375,7 +2381,7 @@
           <a:p>
             <a:fld id="{B2C9DBA1-8D4A-4E57-AA66-EB41DF1E3A11}" type="datetimeFigureOut">
               <a:rPr lang="ko-KR" altLang="en-US" smtClean="0"/>
-              <a:t>2021-03-18</a:t>
+              <a:t>2021-03-23</a:t>
             </a:fld>
             <a:endParaRPr lang="ko-KR" altLang="en-US"/>
           </a:p>
@@ -2663,7 +2669,7 @@
           <a:p>
             <a:fld id="{B2C9DBA1-8D4A-4E57-AA66-EB41DF1E3A11}" type="datetimeFigureOut">
               <a:rPr lang="ko-KR" altLang="en-US" smtClean="0"/>
-              <a:t>2021-03-18</a:t>
+              <a:t>2021-03-23</a:t>
             </a:fld>
             <a:endParaRPr lang="ko-KR" altLang="en-US"/>
           </a:p>
@@ -2904,7 +2910,7 @@
           <a:p>
             <a:fld id="{B2C9DBA1-8D4A-4E57-AA66-EB41DF1E3A11}" type="datetimeFigureOut">
               <a:rPr lang="ko-KR" altLang="en-US" smtClean="0"/>
-              <a:t>2021-03-18</a:t>
+              <a:t>2021-03-23</a:t>
             </a:fld>
             <a:endParaRPr lang="ko-KR" altLang="en-US"/>
           </a:p>
@@ -7046,6 +7052,2042 @@
 </p:sld>
 </file>
 
+<file path=ppt/slides/slide2.xml><?xml version="1.0" encoding="utf-8"?>
+<p:sld xmlns:a="http://schemas.openxmlformats.org/drawingml/2006/main" xmlns:r="http://schemas.openxmlformats.org/officeDocument/2006/relationships" xmlns:p="http://schemas.openxmlformats.org/presentationml/2006/main">
+  <p:cSld>
+    <p:spTree>
+      <p:nvGrpSpPr>
+        <p:cNvPr id="1" name=""/>
+        <p:cNvGrpSpPr/>
+        <p:nvPr/>
+      </p:nvGrpSpPr>
+      <p:grpSpPr>
+        <a:xfrm>
+          <a:off x="0" y="0"/>
+          <a:ext cx="0" cy="0"/>
+          <a:chOff x="0" y="0"/>
+          <a:chExt cx="0" cy="0"/>
+        </a:xfrm>
+      </p:grpSpPr>
+      <p:grpSp>
+        <p:nvGrpSpPr>
+          <p:cNvPr id="4" name="Browser" descr="&lt;SmartSettings&gt;&lt;SmartResize enabled=&quot;True&quot; minWidth=&quot;140&quot; minHeight=&quot;50&quot; /&gt;&lt;/SmartSettings&gt;">
+            <a:extLst>
+              <a:ext uri="{FF2B5EF4-FFF2-40B4-BE49-F238E27FC236}">
+                <a16:creationId xmlns:a16="http://schemas.microsoft.com/office/drawing/2014/main" id="{59074261-2948-4FA3-8FEB-E4EC23A2AFFA}"/>
+              </a:ext>
+            </a:extLst>
+          </p:cNvPr>
+          <p:cNvGrpSpPr/>
+          <p:nvPr>
+            <p:custDataLst>
+              <p:tags r:id="rId1"/>
+            </p:custDataLst>
+          </p:nvPr>
+        </p:nvGrpSpPr>
+        <p:grpSpPr>
+          <a:xfrm>
+            <a:off x="1950948" y="218810"/>
+            <a:ext cx="8571458" cy="6420379"/>
+            <a:chOff x="595683" y="1261242"/>
+            <a:chExt cx="6668462" cy="4352543"/>
+          </a:xfrm>
+        </p:grpSpPr>
+        <p:sp>
+          <p:nvSpPr>
+            <p:cNvPr id="5" name="Window Body" descr="&lt;SmartSettings&gt;&lt;SmartResize anchorLeft=&quot;Absolute&quot; anchorTop=&quot;Absolute&quot; anchorRight=&quot;Absolute&quot; anchorBottom=&quot;Absolute&quot; /&gt;&lt;/SmartSettings&gt;">
+              <a:extLst>
+                <a:ext uri="{FF2B5EF4-FFF2-40B4-BE49-F238E27FC236}">
+                  <a16:creationId xmlns:a16="http://schemas.microsoft.com/office/drawing/2014/main" id="{89FC61BC-3F4A-4387-8E49-86DBE3C8A448}"/>
+                </a:ext>
+              </a:extLst>
+            </p:cNvPr>
+            <p:cNvSpPr/>
+            <p:nvPr>
+              <p:custDataLst>
+                <p:tags r:id="rId2"/>
+              </p:custDataLst>
+            </p:nvPr>
+          </p:nvSpPr>
+          <p:spPr>
+            <a:xfrm>
+              <a:off x="595683" y="1623921"/>
+              <a:ext cx="6668462" cy="3989864"/>
+            </a:xfrm>
+            <a:prstGeom prst="rect">
+              <a:avLst/>
+            </a:prstGeom>
+            <a:solidFill>
+              <a:srgbClr val="FFFFFF"/>
+            </a:solidFill>
+            <a:ln w="6350">
+              <a:solidFill>
+                <a:srgbClr val="808080"/>
+              </a:solidFill>
+            </a:ln>
+          </p:spPr>
+          <p:style>
+            <a:lnRef idx="2">
+              <a:schemeClr val="accent1">
+                <a:shade val="50000"/>
+              </a:schemeClr>
+            </a:lnRef>
+            <a:fillRef idx="1">
+              <a:schemeClr val="accent1"/>
+            </a:fillRef>
+            <a:effectRef idx="0">
+              <a:schemeClr val="accent1"/>
+            </a:effectRef>
+            <a:fontRef idx="minor">
+              <a:schemeClr val="lt1"/>
+            </a:fontRef>
+          </p:style>
+          <p:txBody>
+            <a:bodyPr rot="0" spcFirstLastPara="0" vert="horz" wrap="square" lIns="91440" tIns="45720" rIns="91440" bIns="45720" numCol="1" spcCol="0" rtlCol="0" fromWordArt="0" anchor="ctr" anchorCtr="0" forceAA="0" compatLnSpc="1">
+              <a:prstTxWarp prst="textNoShape">
+                <a:avLst/>
+              </a:prstTxWarp>
+              <a:noAutofit/>
+            </a:bodyPr>
+            <a:lstStyle>
+              <a:defPPr>
+                <a:defRPr lang="en-US"/>
+              </a:defPPr>
+              <a:lvl1pPr marL="0" algn="l" defTabSz="914400" rtl="0" eaLnBrk="1" latinLnBrk="0" hangingPunct="1">
+                <a:defRPr sz="1800" kern="1200">
+                  <a:solidFill>
+                    <a:schemeClr val="lt1"/>
+                  </a:solidFill>
+                  <a:latin typeface="+mn-lt"/>
+                  <a:ea typeface="+mn-ea"/>
+                  <a:cs typeface="+mn-cs"/>
+                </a:defRPr>
+              </a:lvl1pPr>
+              <a:lvl2pPr marL="457200" algn="l" defTabSz="914400" rtl="0" eaLnBrk="1" latinLnBrk="0" hangingPunct="1">
+                <a:defRPr sz="1800" kern="1200">
+                  <a:solidFill>
+                    <a:schemeClr val="lt1"/>
+                  </a:solidFill>
+                  <a:latin typeface="+mn-lt"/>
+                  <a:ea typeface="+mn-ea"/>
+                  <a:cs typeface="+mn-cs"/>
+                </a:defRPr>
+              </a:lvl2pPr>
+              <a:lvl3pPr marL="914400" algn="l" defTabSz="914400" rtl="0" eaLnBrk="1" latinLnBrk="0" hangingPunct="1">
+                <a:defRPr sz="1800" kern="1200">
+                  <a:solidFill>
+                    <a:schemeClr val="lt1"/>
+                  </a:solidFill>
+                  <a:latin typeface="+mn-lt"/>
+                  <a:ea typeface="+mn-ea"/>
+                  <a:cs typeface="+mn-cs"/>
+                </a:defRPr>
+              </a:lvl3pPr>
+              <a:lvl4pPr marL="1371600" algn="l" defTabSz="914400" rtl="0" eaLnBrk="1" latinLnBrk="0" hangingPunct="1">
+                <a:defRPr sz="1800" kern="1200">
+                  <a:solidFill>
+                    <a:schemeClr val="lt1"/>
+                  </a:solidFill>
+                  <a:latin typeface="+mn-lt"/>
+                  <a:ea typeface="+mn-ea"/>
+                  <a:cs typeface="+mn-cs"/>
+                </a:defRPr>
+              </a:lvl4pPr>
+              <a:lvl5pPr marL="1828800" algn="l" defTabSz="914400" rtl="0" eaLnBrk="1" latinLnBrk="0" hangingPunct="1">
+                <a:defRPr sz="1800" kern="1200">
+                  <a:solidFill>
+                    <a:schemeClr val="lt1"/>
+                  </a:solidFill>
+                  <a:latin typeface="+mn-lt"/>
+                  <a:ea typeface="+mn-ea"/>
+                  <a:cs typeface="+mn-cs"/>
+                </a:defRPr>
+              </a:lvl5pPr>
+              <a:lvl6pPr marL="2286000" algn="l" defTabSz="914400" rtl="0" eaLnBrk="1" latinLnBrk="0" hangingPunct="1">
+                <a:defRPr sz="1800" kern="1200">
+                  <a:solidFill>
+                    <a:schemeClr val="lt1"/>
+                  </a:solidFill>
+                  <a:latin typeface="+mn-lt"/>
+                  <a:ea typeface="+mn-ea"/>
+                  <a:cs typeface="+mn-cs"/>
+                </a:defRPr>
+              </a:lvl6pPr>
+              <a:lvl7pPr marL="2743200" algn="l" defTabSz="914400" rtl="0" eaLnBrk="1" latinLnBrk="0" hangingPunct="1">
+                <a:defRPr sz="1800" kern="1200">
+                  <a:solidFill>
+                    <a:schemeClr val="lt1"/>
+                  </a:solidFill>
+                  <a:latin typeface="+mn-lt"/>
+                  <a:ea typeface="+mn-ea"/>
+                  <a:cs typeface="+mn-cs"/>
+                </a:defRPr>
+              </a:lvl7pPr>
+              <a:lvl8pPr marL="3200400" algn="l" defTabSz="914400" rtl="0" eaLnBrk="1" latinLnBrk="0" hangingPunct="1">
+                <a:defRPr sz="1800" kern="1200">
+                  <a:solidFill>
+                    <a:schemeClr val="lt1"/>
+                  </a:solidFill>
+                  <a:latin typeface="+mn-lt"/>
+                  <a:ea typeface="+mn-ea"/>
+                  <a:cs typeface="+mn-cs"/>
+                </a:defRPr>
+              </a:lvl8pPr>
+              <a:lvl9pPr marL="3657600" algn="l" defTabSz="914400" rtl="0" eaLnBrk="1" latinLnBrk="0" hangingPunct="1">
+                <a:defRPr sz="1800" kern="1200">
+                  <a:solidFill>
+                    <a:schemeClr val="lt1"/>
+                  </a:solidFill>
+                  <a:latin typeface="+mn-lt"/>
+                  <a:ea typeface="+mn-ea"/>
+                  <a:cs typeface="+mn-cs"/>
+                </a:defRPr>
+              </a:lvl9pPr>
+            </a:lstStyle>
+            <a:p>
+              <a:pPr algn="ctr"/>
+              <a:endParaRPr lang="en-US" sz="900" dirty="0">
+                <a:solidFill>
+                  <a:srgbClr val="5F5F5F"/>
+                </a:solidFill>
+                <a:latin typeface="Segoe UI" panose="020B0502040204020203" pitchFamily="34" charset="0"/>
+                <a:cs typeface="Segoe UI" panose="020B0502040204020203" pitchFamily="34" charset="0"/>
+              </a:endParaRPr>
+            </a:p>
+          </p:txBody>
+        </p:sp>
+        <p:sp>
+          <p:nvSpPr>
+            <p:cNvPr id="6" name="Title Bar" descr="&lt;SmartSettings&gt;&lt;SmartResize anchorLeft=&quot;Absolute&quot; anchorTop=&quot;Absolute&quot; anchorRight=&quot;Absolute&quot; anchorBottom=&quot;None&quot; /&gt;&lt;/SmartSettings&gt;">
+              <a:extLst>
+                <a:ext uri="{FF2B5EF4-FFF2-40B4-BE49-F238E27FC236}">
+                  <a16:creationId xmlns:a16="http://schemas.microsoft.com/office/drawing/2014/main" id="{428812DA-A12A-40E6-A550-E92E4D0EDB8F}"/>
+                </a:ext>
+              </a:extLst>
+            </p:cNvPr>
+            <p:cNvSpPr/>
+            <p:nvPr>
+              <p:custDataLst>
+                <p:tags r:id="rId3"/>
+              </p:custDataLst>
+            </p:nvPr>
+          </p:nvSpPr>
+          <p:spPr>
+            <a:xfrm>
+              <a:off x="595684" y="1261242"/>
+              <a:ext cx="6668461" cy="364099"/>
+            </a:xfrm>
+            <a:prstGeom prst="rect">
+              <a:avLst/>
+            </a:prstGeom>
+            <a:solidFill>
+              <a:srgbClr val="FFFFFF"/>
+            </a:solidFill>
+            <a:ln w="6350">
+              <a:solidFill>
+                <a:srgbClr val="808080"/>
+              </a:solidFill>
+            </a:ln>
+          </p:spPr>
+          <p:style>
+            <a:lnRef idx="2">
+              <a:schemeClr val="accent1">
+                <a:shade val="50000"/>
+              </a:schemeClr>
+            </a:lnRef>
+            <a:fillRef idx="1">
+              <a:schemeClr val="accent1"/>
+            </a:fillRef>
+            <a:effectRef idx="0">
+              <a:schemeClr val="accent1"/>
+            </a:effectRef>
+            <a:fontRef idx="minor">
+              <a:schemeClr val="lt1"/>
+            </a:fontRef>
+          </p:style>
+          <p:txBody>
+            <a:bodyPr rot="0" spcFirstLastPara="0" vert="horz" wrap="square" lIns="91440" tIns="45720" rIns="228600" bIns="45720" numCol="1" spcCol="0" rtlCol="0" fromWordArt="0" anchor="t" anchorCtr="0" forceAA="0" compatLnSpc="1">
+              <a:prstTxWarp prst="textNoShape">
+                <a:avLst/>
+              </a:prstTxWarp>
+              <a:noAutofit/>
+            </a:bodyPr>
+            <a:lstStyle>
+              <a:defPPr>
+                <a:defRPr lang="en-US"/>
+              </a:defPPr>
+              <a:lvl1pPr marL="0" algn="l" defTabSz="914400" rtl="0" eaLnBrk="1" latinLnBrk="0" hangingPunct="1">
+                <a:defRPr sz="1800" kern="1200">
+                  <a:solidFill>
+                    <a:schemeClr val="lt1"/>
+                  </a:solidFill>
+                  <a:latin typeface="+mn-lt"/>
+                  <a:ea typeface="+mn-ea"/>
+                  <a:cs typeface="+mn-cs"/>
+                </a:defRPr>
+              </a:lvl1pPr>
+              <a:lvl2pPr marL="457200" algn="l" defTabSz="914400" rtl="0" eaLnBrk="1" latinLnBrk="0" hangingPunct="1">
+                <a:defRPr sz="1800" kern="1200">
+                  <a:solidFill>
+                    <a:schemeClr val="lt1"/>
+                  </a:solidFill>
+                  <a:latin typeface="+mn-lt"/>
+                  <a:ea typeface="+mn-ea"/>
+                  <a:cs typeface="+mn-cs"/>
+                </a:defRPr>
+              </a:lvl2pPr>
+              <a:lvl3pPr marL="914400" algn="l" defTabSz="914400" rtl="0" eaLnBrk="1" latinLnBrk="0" hangingPunct="1">
+                <a:defRPr sz="1800" kern="1200">
+                  <a:solidFill>
+                    <a:schemeClr val="lt1"/>
+                  </a:solidFill>
+                  <a:latin typeface="+mn-lt"/>
+                  <a:ea typeface="+mn-ea"/>
+                  <a:cs typeface="+mn-cs"/>
+                </a:defRPr>
+              </a:lvl3pPr>
+              <a:lvl4pPr marL="1371600" algn="l" defTabSz="914400" rtl="0" eaLnBrk="1" latinLnBrk="0" hangingPunct="1">
+                <a:defRPr sz="1800" kern="1200">
+                  <a:solidFill>
+                    <a:schemeClr val="lt1"/>
+                  </a:solidFill>
+                  <a:latin typeface="+mn-lt"/>
+                  <a:ea typeface="+mn-ea"/>
+                  <a:cs typeface="+mn-cs"/>
+                </a:defRPr>
+              </a:lvl4pPr>
+              <a:lvl5pPr marL="1828800" algn="l" defTabSz="914400" rtl="0" eaLnBrk="1" latinLnBrk="0" hangingPunct="1">
+                <a:defRPr sz="1800" kern="1200">
+                  <a:solidFill>
+                    <a:schemeClr val="lt1"/>
+                  </a:solidFill>
+                  <a:latin typeface="+mn-lt"/>
+                  <a:ea typeface="+mn-ea"/>
+                  <a:cs typeface="+mn-cs"/>
+                </a:defRPr>
+              </a:lvl5pPr>
+              <a:lvl6pPr marL="2286000" algn="l" defTabSz="914400" rtl="0" eaLnBrk="1" latinLnBrk="0" hangingPunct="1">
+                <a:defRPr sz="1800" kern="1200">
+                  <a:solidFill>
+                    <a:schemeClr val="lt1"/>
+                  </a:solidFill>
+                  <a:latin typeface="+mn-lt"/>
+                  <a:ea typeface="+mn-ea"/>
+                  <a:cs typeface="+mn-cs"/>
+                </a:defRPr>
+              </a:lvl6pPr>
+              <a:lvl7pPr marL="2743200" algn="l" defTabSz="914400" rtl="0" eaLnBrk="1" latinLnBrk="0" hangingPunct="1">
+                <a:defRPr sz="1800" kern="1200">
+                  <a:solidFill>
+                    <a:schemeClr val="lt1"/>
+                  </a:solidFill>
+                  <a:latin typeface="+mn-lt"/>
+                  <a:ea typeface="+mn-ea"/>
+                  <a:cs typeface="+mn-cs"/>
+                </a:defRPr>
+              </a:lvl7pPr>
+              <a:lvl8pPr marL="3200400" algn="l" defTabSz="914400" rtl="0" eaLnBrk="1" latinLnBrk="0" hangingPunct="1">
+                <a:defRPr sz="1800" kern="1200">
+                  <a:solidFill>
+                    <a:schemeClr val="lt1"/>
+                  </a:solidFill>
+                  <a:latin typeface="+mn-lt"/>
+                  <a:ea typeface="+mn-ea"/>
+                  <a:cs typeface="+mn-cs"/>
+                </a:defRPr>
+              </a:lvl8pPr>
+              <a:lvl9pPr marL="3657600" algn="l" defTabSz="914400" rtl="0" eaLnBrk="1" latinLnBrk="0" hangingPunct="1">
+                <a:defRPr sz="1800" kern="1200">
+                  <a:solidFill>
+                    <a:schemeClr val="lt1"/>
+                  </a:solidFill>
+                  <a:latin typeface="+mn-lt"/>
+                  <a:ea typeface="+mn-ea"/>
+                  <a:cs typeface="+mn-cs"/>
+                </a:defRPr>
+              </a:lvl9pPr>
+            </a:lstStyle>
+            <a:p>
+              <a:r>
+                <a:rPr lang="en-US" sz="900" dirty="0">
+                  <a:solidFill>
+                    <a:srgbClr val="5F5F5F"/>
+                  </a:solidFill>
+                  <a:latin typeface="Segoe UI" panose="020B0502040204020203" pitchFamily="34" charset="0"/>
+                  <a:cs typeface="Segoe UI" panose="020B0502040204020203" pitchFamily="34" charset="0"/>
+                </a:rPr>
+                <a:t>Browser</a:t>
+              </a:r>
+            </a:p>
+          </p:txBody>
+        </p:sp>
+        <p:sp>
+          <p:nvSpPr>
+            <p:cNvPr id="7" name="Menu Button" descr="&lt;SmartSettings&gt;&lt;SmartResize anchorLeft=&quot;None&quot; anchorTop=&quot;Absolute&quot; anchorRight=&quot;Absolute&quot; anchorBottom=&quot;None&quot; /&gt;&lt;/SmartSettings&gt;">
+              <a:extLst>
+                <a:ext uri="{FF2B5EF4-FFF2-40B4-BE49-F238E27FC236}">
+                  <a16:creationId xmlns:a16="http://schemas.microsoft.com/office/drawing/2014/main" id="{EB35F7EF-B88E-48F4-9F75-D031AEE987C3}"/>
+                </a:ext>
+              </a:extLst>
+            </p:cNvPr>
+            <p:cNvSpPr>
+              <a:spLocks noChangeAspect="1" noEditPoints="1"/>
+            </p:cNvSpPr>
+            <p:nvPr>
+              <p:custDataLst>
+                <p:tags r:id="rId4"/>
+              </p:custDataLst>
+            </p:nvPr>
+          </p:nvSpPr>
+          <p:spPr bwMode="auto">
+            <a:xfrm>
+              <a:off x="7079076" y="1469745"/>
+              <a:ext cx="116095" cy="76411"/>
+            </a:xfrm>
+            <a:custGeom>
+              <a:avLst/>
+              <a:gdLst>
+                <a:gd name="T0" fmla="*/ 0 w 415"/>
+                <a:gd name="T1" fmla="*/ 309 h 309"/>
+                <a:gd name="T2" fmla="*/ 415 w 415"/>
+                <a:gd name="T3" fmla="*/ 309 h 309"/>
+                <a:gd name="T4" fmla="*/ 0 w 415"/>
+                <a:gd name="T5" fmla="*/ 155 h 309"/>
+                <a:gd name="T6" fmla="*/ 415 w 415"/>
+                <a:gd name="T7" fmla="*/ 155 h 309"/>
+                <a:gd name="T8" fmla="*/ 0 w 415"/>
+                <a:gd name="T9" fmla="*/ 0 h 309"/>
+                <a:gd name="T10" fmla="*/ 415 w 415"/>
+                <a:gd name="T11" fmla="*/ 0 h 309"/>
+              </a:gdLst>
+              <a:ahLst/>
+              <a:cxnLst>
+                <a:cxn ang="0">
+                  <a:pos x="T0" y="T1"/>
+                </a:cxn>
+                <a:cxn ang="0">
+                  <a:pos x="T2" y="T3"/>
+                </a:cxn>
+                <a:cxn ang="0">
+                  <a:pos x="T4" y="T5"/>
+                </a:cxn>
+                <a:cxn ang="0">
+                  <a:pos x="T6" y="T7"/>
+                </a:cxn>
+                <a:cxn ang="0">
+                  <a:pos x="T8" y="T9"/>
+                </a:cxn>
+                <a:cxn ang="0">
+                  <a:pos x="T10" y="T11"/>
+                </a:cxn>
+              </a:cxnLst>
+              <a:rect l="0" t="0" r="r" b="b"/>
+              <a:pathLst>
+                <a:path w="415" h="309">
+                  <a:moveTo>
+                    <a:pt x="0" y="309"/>
+                  </a:moveTo>
+                  <a:lnTo>
+                    <a:pt x="415" y="309"/>
+                  </a:lnTo>
+                  <a:moveTo>
+                    <a:pt x="0" y="155"/>
+                  </a:moveTo>
+                  <a:lnTo>
+                    <a:pt x="415" y="155"/>
+                  </a:lnTo>
+                  <a:moveTo>
+                    <a:pt x="0" y="0"/>
+                  </a:moveTo>
+                  <a:lnTo>
+                    <a:pt x="415" y="0"/>
+                  </a:lnTo>
+                </a:path>
+              </a:pathLst>
+            </a:custGeom>
+            <a:noFill/>
+            <a:ln w="6350" cap="flat">
+              <a:solidFill>
+                <a:srgbClr val="808080"/>
+              </a:solidFill>
+              <a:prstDash val="solid"/>
+              <a:miter lim="800000"/>
+              <a:headEnd/>
+              <a:tailEnd/>
+            </a:ln>
+            <a:extLst>
+              <a:ext uri="{909E8E84-426E-40DD-AFC4-6F175D3DCCD1}">
+                <a14:hiddenFill xmlns:a14="http://schemas.microsoft.com/office/drawing/2010/main">
+                  <a:solidFill>
+                    <a:srgbClr val="FFFFFF"/>
+                  </a:solidFill>
+                </a14:hiddenFill>
+              </a:ext>
+            </a:extLst>
+          </p:spPr>
+          <p:txBody>
+            <a:bodyPr vert="horz" wrap="square" lIns="91440" tIns="45720" rIns="91440" bIns="45720" numCol="1" anchor="t" anchorCtr="0" compatLnSpc="1">
+              <a:prstTxWarp prst="textNoShape">
+                <a:avLst/>
+              </a:prstTxWarp>
+            </a:bodyPr>
+            <a:lstStyle>
+              <a:defPPr>
+                <a:defRPr lang="en-US"/>
+              </a:defPPr>
+              <a:lvl1pPr marL="0" algn="l" defTabSz="914400" rtl="0" eaLnBrk="1" latinLnBrk="0" hangingPunct="1">
+                <a:defRPr sz="1800" kern="1200">
+                  <a:solidFill>
+                    <a:schemeClr val="tx1"/>
+                  </a:solidFill>
+                  <a:latin typeface="+mn-lt"/>
+                  <a:ea typeface="+mn-ea"/>
+                  <a:cs typeface="+mn-cs"/>
+                </a:defRPr>
+              </a:lvl1pPr>
+              <a:lvl2pPr marL="457200" algn="l" defTabSz="914400" rtl="0" eaLnBrk="1" latinLnBrk="0" hangingPunct="1">
+                <a:defRPr sz="1800" kern="1200">
+                  <a:solidFill>
+                    <a:schemeClr val="tx1"/>
+                  </a:solidFill>
+                  <a:latin typeface="+mn-lt"/>
+                  <a:ea typeface="+mn-ea"/>
+                  <a:cs typeface="+mn-cs"/>
+                </a:defRPr>
+              </a:lvl2pPr>
+              <a:lvl3pPr marL="914400" algn="l" defTabSz="914400" rtl="0" eaLnBrk="1" latinLnBrk="0" hangingPunct="1">
+                <a:defRPr sz="1800" kern="1200">
+                  <a:solidFill>
+                    <a:schemeClr val="tx1"/>
+                  </a:solidFill>
+                  <a:latin typeface="+mn-lt"/>
+                  <a:ea typeface="+mn-ea"/>
+                  <a:cs typeface="+mn-cs"/>
+                </a:defRPr>
+              </a:lvl3pPr>
+              <a:lvl4pPr marL="1371600" algn="l" defTabSz="914400" rtl="0" eaLnBrk="1" latinLnBrk="0" hangingPunct="1">
+                <a:defRPr sz="1800" kern="1200">
+                  <a:solidFill>
+                    <a:schemeClr val="tx1"/>
+                  </a:solidFill>
+                  <a:latin typeface="+mn-lt"/>
+                  <a:ea typeface="+mn-ea"/>
+                  <a:cs typeface="+mn-cs"/>
+                </a:defRPr>
+              </a:lvl4pPr>
+              <a:lvl5pPr marL="1828800" algn="l" defTabSz="914400" rtl="0" eaLnBrk="1" latinLnBrk="0" hangingPunct="1">
+                <a:defRPr sz="1800" kern="1200">
+                  <a:solidFill>
+                    <a:schemeClr val="tx1"/>
+                  </a:solidFill>
+                  <a:latin typeface="+mn-lt"/>
+                  <a:ea typeface="+mn-ea"/>
+                  <a:cs typeface="+mn-cs"/>
+                </a:defRPr>
+              </a:lvl5pPr>
+              <a:lvl6pPr marL="2286000" algn="l" defTabSz="914400" rtl="0" eaLnBrk="1" latinLnBrk="0" hangingPunct="1">
+                <a:defRPr sz="1800" kern="1200">
+                  <a:solidFill>
+                    <a:schemeClr val="tx1"/>
+                  </a:solidFill>
+                  <a:latin typeface="+mn-lt"/>
+                  <a:ea typeface="+mn-ea"/>
+                  <a:cs typeface="+mn-cs"/>
+                </a:defRPr>
+              </a:lvl6pPr>
+              <a:lvl7pPr marL="2743200" algn="l" defTabSz="914400" rtl="0" eaLnBrk="1" latinLnBrk="0" hangingPunct="1">
+                <a:defRPr sz="1800" kern="1200">
+                  <a:solidFill>
+                    <a:schemeClr val="tx1"/>
+                  </a:solidFill>
+                  <a:latin typeface="+mn-lt"/>
+                  <a:ea typeface="+mn-ea"/>
+                  <a:cs typeface="+mn-cs"/>
+                </a:defRPr>
+              </a:lvl7pPr>
+              <a:lvl8pPr marL="3200400" algn="l" defTabSz="914400" rtl="0" eaLnBrk="1" latinLnBrk="0" hangingPunct="1">
+                <a:defRPr sz="1800" kern="1200">
+                  <a:solidFill>
+                    <a:schemeClr val="tx1"/>
+                  </a:solidFill>
+                  <a:latin typeface="+mn-lt"/>
+                  <a:ea typeface="+mn-ea"/>
+                  <a:cs typeface="+mn-cs"/>
+                </a:defRPr>
+              </a:lvl8pPr>
+              <a:lvl9pPr marL="3657600" algn="l" defTabSz="914400" rtl="0" eaLnBrk="1" latinLnBrk="0" hangingPunct="1">
+                <a:defRPr sz="1800" kern="1200">
+                  <a:solidFill>
+                    <a:schemeClr val="tx1"/>
+                  </a:solidFill>
+                  <a:latin typeface="+mn-lt"/>
+                  <a:ea typeface="+mn-ea"/>
+                  <a:cs typeface="+mn-cs"/>
+                </a:defRPr>
+              </a:lvl9pPr>
+            </a:lstStyle>
+            <a:p>
+              <a:endParaRPr lang="en-US">
+                <a:solidFill>
+                  <a:srgbClr val="5F5F5F"/>
+                </a:solidFill>
+                <a:latin typeface="Segoe UI" panose="020B0502040204020203" pitchFamily="34" charset="0"/>
+                <a:cs typeface="Segoe UI" panose="020B0502040204020203" pitchFamily="34" charset="0"/>
+              </a:endParaRPr>
+            </a:p>
+          </p:txBody>
+        </p:sp>
+        <p:sp>
+          <p:nvSpPr>
+            <p:cNvPr id="8" name="Close Button" descr="&lt;SmartSettings&gt;&lt;SmartResize anchorLeft=&quot;None&quot; anchorTop=&quot;Absolute&quot; anchorRight=&quot;Absolute&quot; anchorBottom=&quot;None&quot; /&gt;&lt;/SmartSettings&gt;">
+              <a:extLst>
+                <a:ext uri="{FF2B5EF4-FFF2-40B4-BE49-F238E27FC236}">
+                  <a16:creationId xmlns:a16="http://schemas.microsoft.com/office/drawing/2014/main" id="{6EB75456-0E8B-44FD-A966-A44B5DC7E05A}"/>
+                </a:ext>
+              </a:extLst>
+            </p:cNvPr>
+            <p:cNvSpPr>
+              <a:spLocks noEditPoints="1"/>
+            </p:cNvSpPr>
+            <p:nvPr>
+              <p:custDataLst>
+                <p:tags r:id="rId5"/>
+              </p:custDataLst>
+            </p:nvPr>
+          </p:nvSpPr>
+          <p:spPr bwMode="auto">
+            <a:xfrm>
+              <a:off x="7100081" y="1309542"/>
+              <a:ext cx="76573" cy="64572"/>
+            </a:xfrm>
+            <a:custGeom>
+              <a:avLst/>
+              <a:gdLst>
+                <a:gd name="T0" fmla="*/ 254 w 254"/>
+                <a:gd name="T1" fmla="*/ 0 h 254"/>
+                <a:gd name="T2" fmla="*/ 0 w 254"/>
+                <a:gd name="T3" fmla="*/ 254 h 254"/>
+                <a:gd name="T4" fmla="*/ 0 w 254"/>
+                <a:gd name="T5" fmla="*/ 0 h 254"/>
+                <a:gd name="T6" fmla="*/ 254 w 254"/>
+                <a:gd name="T7" fmla="*/ 254 h 254"/>
+              </a:gdLst>
+              <a:ahLst/>
+              <a:cxnLst>
+                <a:cxn ang="0">
+                  <a:pos x="T0" y="T1"/>
+                </a:cxn>
+                <a:cxn ang="0">
+                  <a:pos x="T2" y="T3"/>
+                </a:cxn>
+                <a:cxn ang="0">
+                  <a:pos x="T4" y="T5"/>
+                </a:cxn>
+                <a:cxn ang="0">
+                  <a:pos x="T6" y="T7"/>
+                </a:cxn>
+              </a:cxnLst>
+              <a:rect l="0" t="0" r="r" b="b"/>
+              <a:pathLst>
+                <a:path w="254" h="254">
+                  <a:moveTo>
+                    <a:pt x="254" y="0"/>
+                  </a:moveTo>
+                  <a:lnTo>
+                    <a:pt x="0" y="254"/>
+                  </a:lnTo>
+                  <a:moveTo>
+                    <a:pt x="0" y="0"/>
+                  </a:moveTo>
+                  <a:lnTo>
+                    <a:pt x="254" y="254"/>
+                  </a:lnTo>
+                </a:path>
+              </a:pathLst>
+            </a:custGeom>
+            <a:noFill/>
+            <a:ln w="9525" cap="flat">
+              <a:solidFill>
+                <a:srgbClr val="808080"/>
+              </a:solidFill>
+              <a:prstDash val="solid"/>
+              <a:miter lim="800000"/>
+              <a:headEnd/>
+              <a:tailEnd/>
+            </a:ln>
+            <a:extLst>
+              <a:ext uri="{909E8E84-426E-40DD-AFC4-6F175D3DCCD1}">
+                <a14:hiddenFill xmlns:a14="http://schemas.microsoft.com/office/drawing/2010/main">
+                  <a:solidFill>
+                    <a:srgbClr val="FFFFFF"/>
+                  </a:solidFill>
+                </a14:hiddenFill>
+              </a:ext>
+            </a:extLst>
+          </p:spPr>
+          <p:txBody>
+            <a:bodyPr vert="horz" wrap="square" lIns="91440" tIns="45720" rIns="91440" bIns="45720" numCol="1" anchor="t" anchorCtr="0" compatLnSpc="1">
+              <a:prstTxWarp prst="textNoShape">
+                <a:avLst/>
+              </a:prstTxWarp>
+            </a:bodyPr>
+            <a:lstStyle>
+              <a:defPPr>
+                <a:defRPr lang="en-US"/>
+              </a:defPPr>
+              <a:lvl1pPr marL="0" algn="l" defTabSz="914400" rtl="0" eaLnBrk="1" latinLnBrk="0" hangingPunct="1">
+                <a:defRPr sz="1800" kern="1200">
+                  <a:solidFill>
+                    <a:schemeClr val="tx1"/>
+                  </a:solidFill>
+                  <a:latin typeface="+mn-lt"/>
+                  <a:ea typeface="+mn-ea"/>
+                  <a:cs typeface="+mn-cs"/>
+                </a:defRPr>
+              </a:lvl1pPr>
+              <a:lvl2pPr marL="457200" algn="l" defTabSz="914400" rtl="0" eaLnBrk="1" latinLnBrk="0" hangingPunct="1">
+                <a:defRPr sz="1800" kern="1200">
+                  <a:solidFill>
+                    <a:schemeClr val="tx1"/>
+                  </a:solidFill>
+                  <a:latin typeface="+mn-lt"/>
+                  <a:ea typeface="+mn-ea"/>
+                  <a:cs typeface="+mn-cs"/>
+                </a:defRPr>
+              </a:lvl2pPr>
+              <a:lvl3pPr marL="914400" algn="l" defTabSz="914400" rtl="0" eaLnBrk="1" latinLnBrk="0" hangingPunct="1">
+                <a:defRPr sz="1800" kern="1200">
+                  <a:solidFill>
+                    <a:schemeClr val="tx1"/>
+                  </a:solidFill>
+                  <a:latin typeface="+mn-lt"/>
+                  <a:ea typeface="+mn-ea"/>
+                  <a:cs typeface="+mn-cs"/>
+                </a:defRPr>
+              </a:lvl3pPr>
+              <a:lvl4pPr marL="1371600" algn="l" defTabSz="914400" rtl="0" eaLnBrk="1" latinLnBrk="0" hangingPunct="1">
+                <a:defRPr sz="1800" kern="1200">
+                  <a:solidFill>
+                    <a:schemeClr val="tx1"/>
+                  </a:solidFill>
+                  <a:latin typeface="+mn-lt"/>
+                  <a:ea typeface="+mn-ea"/>
+                  <a:cs typeface="+mn-cs"/>
+                </a:defRPr>
+              </a:lvl4pPr>
+              <a:lvl5pPr marL="1828800" algn="l" defTabSz="914400" rtl="0" eaLnBrk="1" latinLnBrk="0" hangingPunct="1">
+                <a:defRPr sz="1800" kern="1200">
+                  <a:solidFill>
+                    <a:schemeClr val="tx1"/>
+                  </a:solidFill>
+                  <a:latin typeface="+mn-lt"/>
+                  <a:ea typeface="+mn-ea"/>
+                  <a:cs typeface="+mn-cs"/>
+                </a:defRPr>
+              </a:lvl5pPr>
+              <a:lvl6pPr marL="2286000" algn="l" defTabSz="914400" rtl="0" eaLnBrk="1" latinLnBrk="0" hangingPunct="1">
+                <a:defRPr sz="1800" kern="1200">
+                  <a:solidFill>
+                    <a:schemeClr val="tx1"/>
+                  </a:solidFill>
+                  <a:latin typeface="+mn-lt"/>
+                  <a:ea typeface="+mn-ea"/>
+                  <a:cs typeface="+mn-cs"/>
+                </a:defRPr>
+              </a:lvl6pPr>
+              <a:lvl7pPr marL="2743200" algn="l" defTabSz="914400" rtl="0" eaLnBrk="1" latinLnBrk="0" hangingPunct="1">
+                <a:defRPr sz="1800" kern="1200">
+                  <a:solidFill>
+                    <a:schemeClr val="tx1"/>
+                  </a:solidFill>
+                  <a:latin typeface="+mn-lt"/>
+                  <a:ea typeface="+mn-ea"/>
+                  <a:cs typeface="+mn-cs"/>
+                </a:defRPr>
+              </a:lvl7pPr>
+              <a:lvl8pPr marL="3200400" algn="l" defTabSz="914400" rtl="0" eaLnBrk="1" latinLnBrk="0" hangingPunct="1">
+                <a:defRPr sz="1800" kern="1200">
+                  <a:solidFill>
+                    <a:schemeClr val="tx1"/>
+                  </a:solidFill>
+                  <a:latin typeface="+mn-lt"/>
+                  <a:ea typeface="+mn-ea"/>
+                  <a:cs typeface="+mn-cs"/>
+                </a:defRPr>
+              </a:lvl8pPr>
+              <a:lvl9pPr marL="3657600" algn="l" defTabSz="914400" rtl="0" eaLnBrk="1" latinLnBrk="0" hangingPunct="1">
+                <a:defRPr sz="1800" kern="1200">
+                  <a:solidFill>
+                    <a:schemeClr val="tx1"/>
+                  </a:solidFill>
+                  <a:latin typeface="+mn-lt"/>
+                  <a:ea typeface="+mn-ea"/>
+                  <a:cs typeface="+mn-cs"/>
+                </a:defRPr>
+              </a:lvl9pPr>
+            </a:lstStyle>
+            <a:p>
+              <a:endParaRPr lang="en-US">
+                <a:solidFill>
+                  <a:srgbClr val="5F5F5F"/>
+                </a:solidFill>
+                <a:latin typeface="Segoe UI" panose="020B0502040204020203" pitchFamily="34" charset="0"/>
+                <a:cs typeface="Segoe UI" panose="020B0502040204020203" pitchFamily="34" charset="0"/>
+              </a:endParaRPr>
+            </a:p>
+          </p:txBody>
+        </p:sp>
+        <p:sp>
+          <p:nvSpPr>
+            <p:cNvPr id="9" name="Address Box" descr="&lt;SmartSettings&gt;&lt;SmartResize anchorLeft=&quot;Absolute&quot; anchorTop=&quot;Absolute&quot; anchorRight=&quot;Absolute&quot; anchorBottom=&quot;None&quot; /&gt;&lt;/SmartSettings&gt;">
+              <a:extLst>
+                <a:ext uri="{FF2B5EF4-FFF2-40B4-BE49-F238E27FC236}">
+                  <a16:creationId xmlns:a16="http://schemas.microsoft.com/office/drawing/2014/main" id="{0AD44259-25D0-45CB-8874-76349C377B50}"/>
+                </a:ext>
+              </a:extLst>
+            </p:cNvPr>
+            <p:cNvSpPr/>
+            <p:nvPr>
+              <p:custDataLst>
+                <p:tags r:id="rId6"/>
+              </p:custDataLst>
+            </p:nvPr>
+          </p:nvSpPr>
+          <p:spPr>
+            <a:xfrm>
+              <a:off x="1298138" y="1427364"/>
+              <a:ext cx="5711965" cy="161173"/>
+            </a:xfrm>
+            <a:prstGeom prst="rect">
+              <a:avLst/>
+            </a:prstGeom>
+            <a:solidFill>
+              <a:srgbClr val="FFFFFF"/>
+            </a:solidFill>
+            <a:ln w="6350">
+              <a:solidFill>
+                <a:srgbClr val="808080"/>
+              </a:solidFill>
+            </a:ln>
+          </p:spPr>
+          <p:style>
+            <a:lnRef idx="2">
+              <a:schemeClr val="accent1">
+                <a:shade val="50000"/>
+              </a:schemeClr>
+            </a:lnRef>
+            <a:fillRef idx="1">
+              <a:schemeClr val="accent1"/>
+            </a:fillRef>
+            <a:effectRef idx="0">
+              <a:schemeClr val="accent1"/>
+            </a:effectRef>
+            <a:fontRef idx="minor">
+              <a:schemeClr val="lt1"/>
+            </a:fontRef>
+          </p:style>
+          <p:txBody>
+            <a:bodyPr rot="0" spcFirstLastPara="0" vert="horz" wrap="square" lIns="237744" tIns="45720" rIns="91440" bIns="45720" numCol="1" spcCol="0" rtlCol="0" fromWordArt="0" anchor="ctr" anchorCtr="0" forceAA="0" compatLnSpc="1">
+              <a:prstTxWarp prst="textNoShape">
+                <a:avLst/>
+              </a:prstTxWarp>
+              <a:noAutofit/>
+            </a:bodyPr>
+            <a:lstStyle>
+              <a:defPPr>
+                <a:defRPr lang="en-US"/>
+              </a:defPPr>
+              <a:lvl1pPr marL="0" algn="l" defTabSz="914400" rtl="0" eaLnBrk="1" latinLnBrk="0" hangingPunct="1">
+                <a:defRPr sz="1800" kern="1200">
+                  <a:solidFill>
+                    <a:schemeClr val="lt1"/>
+                  </a:solidFill>
+                  <a:latin typeface="+mn-lt"/>
+                  <a:ea typeface="+mn-ea"/>
+                  <a:cs typeface="+mn-cs"/>
+                </a:defRPr>
+              </a:lvl1pPr>
+              <a:lvl2pPr marL="457200" algn="l" defTabSz="914400" rtl="0" eaLnBrk="1" latinLnBrk="0" hangingPunct="1">
+                <a:defRPr sz="1800" kern="1200">
+                  <a:solidFill>
+                    <a:schemeClr val="lt1"/>
+                  </a:solidFill>
+                  <a:latin typeface="+mn-lt"/>
+                  <a:ea typeface="+mn-ea"/>
+                  <a:cs typeface="+mn-cs"/>
+                </a:defRPr>
+              </a:lvl2pPr>
+              <a:lvl3pPr marL="914400" algn="l" defTabSz="914400" rtl="0" eaLnBrk="1" latinLnBrk="0" hangingPunct="1">
+                <a:defRPr sz="1800" kern="1200">
+                  <a:solidFill>
+                    <a:schemeClr val="lt1"/>
+                  </a:solidFill>
+                  <a:latin typeface="+mn-lt"/>
+                  <a:ea typeface="+mn-ea"/>
+                  <a:cs typeface="+mn-cs"/>
+                </a:defRPr>
+              </a:lvl3pPr>
+              <a:lvl4pPr marL="1371600" algn="l" defTabSz="914400" rtl="0" eaLnBrk="1" latinLnBrk="0" hangingPunct="1">
+                <a:defRPr sz="1800" kern="1200">
+                  <a:solidFill>
+                    <a:schemeClr val="lt1"/>
+                  </a:solidFill>
+                  <a:latin typeface="+mn-lt"/>
+                  <a:ea typeface="+mn-ea"/>
+                  <a:cs typeface="+mn-cs"/>
+                </a:defRPr>
+              </a:lvl4pPr>
+              <a:lvl5pPr marL="1828800" algn="l" defTabSz="914400" rtl="0" eaLnBrk="1" latinLnBrk="0" hangingPunct="1">
+                <a:defRPr sz="1800" kern="1200">
+                  <a:solidFill>
+                    <a:schemeClr val="lt1"/>
+                  </a:solidFill>
+                  <a:latin typeface="+mn-lt"/>
+                  <a:ea typeface="+mn-ea"/>
+                  <a:cs typeface="+mn-cs"/>
+                </a:defRPr>
+              </a:lvl5pPr>
+              <a:lvl6pPr marL="2286000" algn="l" defTabSz="914400" rtl="0" eaLnBrk="1" latinLnBrk="0" hangingPunct="1">
+                <a:defRPr sz="1800" kern="1200">
+                  <a:solidFill>
+                    <a:schemeClr val="lt1"/>
+                  </a:solidFill>
+                  <a:latin typeface="+mn-lt"/>
+                  <a:ea typeface="+mn-ea"/>
+                  <a:cs typeface="+mn-cs"/>
+                </a:defRPr>
+              </a:lvl6pPr>
+              <a:lvl7pPr marL="2743200" algn="l" defTabSz="914400" rtl="0" eaLnBrk="1" latinLnBrk="0" hangingPunct="1">
+                <a:defRPr sz="1800" kern="1200">
+                  <a:solidFill>
+                    <a:schemeClr val="lt1"/>
+                  </a:solidFill>
+                  <a:latin typeface="+mn-lt"/>
+                  <a:ea typeface="+mn-ea"/>
+                  <a:cs typeface="+mn-cs"/>
+                </a:defRPr>
+              </a:lvl7pPr>
+              <a:lvl8pPr marL="3200400" algn="l" defTabSz="914400" rtl="0" eaLnBrk="1" latinLnBrk="0" hangingPunct="1">
+                <a:defRPr sz="1800" kern="1200">
+                  <a:solidFill>
+                    <a:schemeClr val="lt1"/>
+                  </a:solidFill>
+                  <a:latin typeface="+mn-lt"/>
+                  <a:ea typeface="+mn-ea"/>
+                  <a:cs typeface="+mn-cs"/>
+                </a:defRPr>
+              </a:lvl8pPr>
+              <a:lvl9pPr marL="3657600" algn="l" defTabSz="914400" rtl="0" eaLnBrk="1" latinLnBrk="0" hangingPunct="1">
+                <a:defRPr sz="1800" kern="1200">
+                  <a:solidFill>
+                    <a:schemeClr val="lt1"/>
+                  </a:solidFill>
+                  <a:latin typeface="+mn-lt"/>
+                  <a:ea typeface="+mn-ea"/>
+                  <a:cs typeface="+mn-cs"/>
+                </a:defRPr>
+              </a:lvl9pPr>
+            </a:lstStyle>
+            <a:p>
+              <a:r>
+                <a:rPr lang="en-US" sz="900" noProof="1">
+                  <a:solidFill>
+                    <a:srgbClr val="5F5F5F"/>
+                  </a:solidFill>
+                  <a:latin typeface="Segoe UI" panose="020B0502040204020203" pitchFamily="34" charset="0"/>
+                  <a:cs typeface="Segoe UI" panose="020B0502040204020203" pitchFamily="34" charset="0"/>
+                </a:rPr>
+                <a:t>www.example.com</a:t>
+              </a:r>
+            </a:p>
+          </p:txBody>
+        </p:sp>
+        <p:sp>
+          <p:nvSpPr>
+            <p:cNvPr id="10" name="Document Icon" descr="&lt;SmartSettings&gt;&lt;SmartResize anchorLeft=&quot;Absolute&quot; anchorTop=&quot;Absolute&quot; anchorRight=&quot;None&quot; anchorBottom=&quot;None&quot; /&gt;&lt;/SmartSettings&gt;">
+              <a:extLst>
+                <a:ext uri="{FF2B5EF4-FFF2-40B4-BE49-F238E27FC236}">
+                  <a16:creationId xmlns:a16="http://schemas.microsoft.com/office/drawing/2014/main" id="{AAAFAE31-7749-4E69-93CC-B2D6512D93E1}"/>
+                </a:ext>
+              </a:extLst>
+            </p:cNvPr>
+            <p:cNvSpPr>
+              <a:spLocks noChangeAspect="1" noEditPoints="1"/>
+            </p:cNvSpPr>
+            <p:nvPr>
+              <p:custDataLst>
+                <p:tags r:id="rId7"/>
+              </p:custDataLst>
+            </p:nvPr>
+          </p:nvSpPr>
+          <p:spPr bwMode="auto">
+            <a:xfrm>
+              <a:off x="1357361" y="1462748"/>
+              <a:ext cx="72868" cy="90401"/>
+            </a:xfrm>
+            <a:custGeom>
+              <a:avLst/>
+              <a:gdLst>
+                <a:gd name="T0" fmla="*/ 153 w 260"/>
+                <a:gd name="T1" fmla="*/ 7 h 367"/>
+                <a:gd name="T2" fmla="*/ 153 w 260"/>
+                <a:gd name="T3" fmla="*/ 108 h 367"/>
+                <a:gd name="T4" fmla="*/ 253 w 260"/>
+                <a:gd name="T5" fmla="*/ 108 h 367"/>
+                <a:gd name="T6" fmla="*/ 0 w 260"/>
+                <a:gd name="T7" fmla="*/ 0 h 367"/>
+                <a:gd name="T8" fmla="*/ 0 w 260"/>
+                <a:gd name="T9" fmla="*/ 367 h 367"/>
+                <a:gd name="T10" fmla="*/ 260 w 260"/>
+                <a:gd name="T11" fmla="*/ 367 h 367"/>
+                <a:gd name="T12" fmla="*/ 260 w 260"/>
+                <a:gd name="T13" fmla="*/ 100 h 367"/>
+                <a:gd name="T14" fmla="*/ 161 w 260"/>
+                <a:gd name="T15" fmla="*/ 1 h 367"/>
+                <a:gd name="T16" fmla="*/ 0 w 260"/>
+                <a:gd name="T17" fmla="*/ 0 h 367"/>
+              </a:gdLst>
+              <a:ahLst/>
+              <a:cxnLst>
+                <a:cxn ang="0">
+                  <a:pos x="T0" y="T1"/>
+                </a:cxn>
+                <a:cxn ang="0">
+                  <a:pos x="T2" y="T3"/>
+                </a:cxn>
+                <a:cxn ang="0">
+                  <a:pos x="T4" y="T5"/>
+                </a:cxn>
+                <a:cxn ang="0">
+                  <a:pos x="T6" y="T7"/>
+                </a:cxn>
+                <a:cxn ang="0">
+                  <a:pos x="T8" y="T9"/>
+                </a:cxn>
+                <a:cxn ang="0">
+                  <a:pos x="T10" y="T11"/>
+                </a:cxn>
+                <a:cxn ang="0">
+                  <a:pos x="T12" y="T13"/>
+                </a:cxn>
+                <a:cxn ang="0">
+                  <a:pos x="T14" y="T15"/>
+                </a:cxn>
+                <a:cxn ang="0">
+                  <a:pos x="T16" y="T17"/>
+                </a:cxn>
+              </a:cxnLst>
+              <a:rect l="0" t="0" r="r" b="b"/>
+              <a:pathLst>
+                <a:path w="260" h="367">
+                  <a:moveTo>
+                    <a:pt x="153" y="7"/>
+                  </a:moveTo>
+                  <a:lnTo>
+                    <a:pt x="153" y="108"/>
+                  </a:lnTo>
+                  <a:lnTo>
+                    <a:pt x="253" y="108"/>
+                  </a:lnTo>
+                  <a:moveTo>
+                    <a:pt x="0" y="0"/>
+                  </a:moveTo>
+                  <a:lnTo>
+                    <a:pt x="0" y="367"/>
+                  </a:lnTo>
+                  <a:lnTo>
+                    <a:pt x="260" y="367"/>
+                  </a:lnTo>
+                  <a:lnTo>
+                    <a:pt x="260" y="100"/>
+                  </a:lnTo>
+                  <a:lnTo>
+                    <a:pt x="161" y="1"/>
+                  </a:lnTo>
+                  <a:lnTo>
+                    <a:pt x="0" y="0"/>
+                  </a:lnTo>
+                  <a:close/>
+                </a:path>
+              </a:pathLst>
+            </a:custGeom>
+            <a:noFill/>
+            <a:ln w="6350" cap="flat">
+              <a:solidFill>
+                <a:srgbClr val="808080"/>
+              </a:solidFill>
+              <a:prstDash val="solid"/>
+              <a:miter lim="800000"/>
+              <a:headEnd/>
+              <a:tailEnd/>
+            </a:ln>
+            <a:extLst>
+              <a:ext uri="{909E8E84-426E-40DD-AFC4-6F175D3DCCD1}">
+                <a14:hiddenFill xmlns:a14="http://schemas.microsoft.com/office/drawing/2010/main">
+                  <a:solidFill>
+                    <a:srgbClr val="FFFFFF"/>
+                  </a:solidFill>
+                </a14:hiddenFill>
+              </a:ext>
+            </a:extLst>
+          </p:spPr>
+          <p:txBody>
+            <a:bodyPr vert="horz" wrap="square" lIns="91440" tIns="45720" rIns="91440" bIns="45720" numCol="1" anchor="t" anchorCtr="0" compatLnSpc="1">
+              <a:prstTxWarp prst="textNoShape">
+                <a:avLst/>
+              </a:prstTxWarp>
+            </a:bodyPr>
+            <a:lstStyle>
+              <a:defPPr>
+                <a:defRPr lang="en-US"/>
+              </a:defPPr>
+              <a:lvl1pPr marL="0" algn="l" defTabSz="914400" rtl="0" eaLnBrk="1" latinLnBrk="0" hangingPunct="1">
+                <a:defRPr sz="1800" kern="1200">
+                  <a:solidFill>
+                    <a:schemeClr val="tx1"/>
+                  </a:solidFill>
+                  <a:latin typeface="+mn-lt"/>
+                  <a:ea typeface="+mn-ea"/>
+                  <a:cs typeface="+mn-cs"/>
+                </a:defRPr>
+              </a:lvl1pPr>
+              <a:lvl2pPr marL="457200" algn="l" defTabSz="914400" rtl="0" eaLnBrk="1" latinLnBrk="0" hangingPunct="1">
+                <a:defRPr sz="1800" kern="1200">
+                  <a:solidFill>
+                    <a:schemeClr val="tx1"/>
+                  </a:solidFill>
+                  <a:latin typeface="+mn-lt"/>
+                  <a:ea typeface="+mn-ea"/>
+                  <a:cs typeface="+mn-cs"/>
+                </a:defRPr>
+              </a:lvl2pPr>
+              <a:lvl3pPr marL="914400" algn="l" defTabSz="914400" rtl="0" eaLnBrk="1" latinLnBrk="0" hangingPunct="1">
+                <a:defRPr sz="1800" kern="1200">
+                  <a:solidFill>
+                    <a:schemeClr val="tx1"/>
+                  </a:solidFill>
+                  <a:latin typeface="+mn-lt"/>
+                  <a:ea typeface="+mn-ea"/>
+                  <a:cs typeface="+mn-cs"/>
+                </a:defRPr>
+              </a:lvl3pPr>
+              <a:lvl4pPr marL="1371600" algn="l" defTabSz="914400" rtl="0" eaLnBrk="1" latinLnBrk="0" hangingPunct="1">
+                <a:defRPr sz="1800" kern="1200">
+                  <a:solidFill>
+                    <a:schemeClr val="tx1"/>
+                  </a:solidFill>
+                  <a:latin typeface="+mn-lt"/>
+                  <a:ea typeface="+mn-ea"/>
+                  <a:cs typeface="+mn-cs"/>
+                </a:defRPr>
+              </a:lvl4pPr>
+              <a:lvl5pPr marL="1828800" algn="l" defTabSz="914400" rtl="0" eaLnBrk="1" latinLnBrk="0" hangingPunct="1">
+                <a:defRPr sz="1800" kern="1200">
+                  <a:solidFill>
+                    <a:schemeClr val="tx1"/>
+                  </a:solidFill>
+                  <a:latin typeface="+mn-lt"/>
+                  <a:ea typeface="+mn-ea"/>
+                  <a:cs typeface="+mn-cs"/>
+                </a:defRPr>
+              </a:lvl5pPr>
+              <a:lvl6pPr marL="2286000" algn="l" defTabSz="914400" rtl="0" eaLnBrk="1" latinLnBrk="0" hangingPunct="1">
+                <a:defRPr sz="1800" kern="1200">
+                  <a:solidFill>
+                    <a:schemeClr val="tx1"/>
+                  </a:solidFill>
+                  <a:latin typeface="+mn-lt"/>
+                  <a:ea typeface="+mn-ea"/>
+                  <a:cs typeface="+mn-cs"/>
+                </a:defRPr>
+              </a:lvl6pPr>
+              <a:lvl7pPr marL="2743200" algn="l" defTabSz="914400" rtl="0" eaLnBrk="1" latinLnBrk="0" hangingPunct="1">
+                <a:defRPr sz="1800" kern="1200">
+                  <a:solidFill>
+                    <a:schemeClr val="tx1"/>
+                  </a:solidFill>
+                  <a:latin typeface="+mn-lt"/>
+                  <a:ea typeface="+mn-ea"/>
+                  <a:cs typeface="+mn-cs"/>
+                </a:defRPr>
+              </a:lvl7pPr>
+              <a:lvl8pPr marL="3200400" algn="l" defTabSz="914400" rtl="0" eaLnBrk="1" latinLnBrk="0" hangingPunct="1">
+                <a:defRPr sz="1800" kern="1200">
+                  <a:solidFill>
+                    <a:schemeClr val="tx1"/>
+                  </a:solidFill>
+                  <a:latin typeface="+mn-lt"/>
+                  <a:ea typeface="+mn-ea"/>
+                  <a:cs typeface="+mn-cs"/>
+                </a:defRPr>
+              </a:lvl8pPr>
+              <a:lvl9pPr marL="3657600" algn="l" defTabSz="914400" rtl="0" eaLnBrk="1" latinLnBrk="0" hangingPunct="1">
+                <a:defRPr sz="1800" kern="1200">
+                  <a:solidFill>
+                    <a:schemeClr val="tx1"/>
+                  </a:solidFill>
+                  <a:latin typeface="+mn-lt"/>
+                  <a:ea typeface="+mn-ea"/>
+                  <a:cs typeface="+mn-cs"/>
+                </a:defRPr>
+              </a:lvl9pPr>
+            </a:lstStyle>
+            <a:p>
+              <a:endParaRPr lang="en-US">
+                <a:solidFill>
+                  <a:srgbClr val="5F5F5F"/>
+                </a:solidFill>
+                <a:latin typeface="Segoe UI" panose="020B0502040204020203" pitchFamily="34" charset="0"/>
+                <a:cs typeface="Segoe UI" panose="020B0502040204020203" pitchFamily="34" charset="0"/>
+              </a:endParaRPr>
+            </a:p>
+          </p:txBody>
+        </p:sp>
+        <p:grpSp>
+          <p:nvGrpSpPr>
+            <p:cNvPr id="11" name="Navigation Buttons">
+              <a:extLst>
+                <a:ext uri="{FF2B5EF4-FFF2-40B4-BE49-F238E27FC236}">
+                  <a16:creationId xmlns:a16="http://schemas.microsoft.com/office/drawing/2014/main" id="{777CDA36-9881-4290-B170-2874A82A4764}"/>
+                </a:ext>
+              </a:extLst>
+            </p:cNvPr>
+            <p:cNvGrpSpPr/>
+            <p:nvPr/>
+          </p:nvGrpSpPr>
+          <p:grpSpPr>
+            <a:xfrm>
+              <a:off x="693642" y="1449296"/>
+              <a:ext cx="498961" cy="117307"/>
+              <a:chOff x="693642" y="1449296"/>
+              <a:chExt cx="498961" cy="117307"/>
+            </a:xfrm>
+          </p:grpSpPr>
+          <p:sp>
+            <p:nvSpPr>
+              <p:cNvPr id="12" name="Back Button" descr="&lt;SmartSettings&gt;&lt;SmartResize anchorLeft=&quot;Absolute&quot; anchorTop=&quot;Absolute&quot; anchorRight=&quot;None&quot; anchorBottom=&quot;None&quot; /&gt;&lt;/SmartSettings&gt;">
+                <a:extLst>
+                  <a:ext uri="{FF2B5EF4-FFF2-40B4-BE49-F238E27FC236}">
+                    <a16:creationId xmlns:a16="http://schemas.microsoft.com/office/drawing/2014/main" id="{13B515DE-1AE4-47F1-8103-C557E9E8E357}"/>
+                  </a:ext>
+                </a:extLst>
+              </p:cNvPr>
+              <p:cNvSpPr>
+                <a:spLocks noChangeAspect="1" noEditPoints="1"/>
+              </p:cNvSpPr>
+              <p:nvPr>
+                <p:custDataLst>
+                  <p:tags r:id="rId8"/>
+                </p:custDataLst>
+              </p:nvPr>
+            </p:nvSpPr>
+            <p:spPr bwMode="auto">
+              <a:xfrm>
+                <a:off x="693642" y="1467054"/>
+                <a:ext cx="118565" cy="81792"/>
+              </a:xfrm>
+              <a:custGeom>
+                <a:avLst/>
+                <a:gdLst>
+                  <a:gd name="T0" fmla="*/ 159 w 423"/>
+                  <a:gd name="T1" fmla="*/ 332 h 332"/>
+                  <a:gd name="T2" fmla="*/ 0 w 423"/>
+                  <a:gd name="T3" fmla="*/ 166 h 332"/>
+                  <a:gd name="T4" fmla="*/ 159 w 423"/>
+                  <a:gd name="T5" fmla="*/ 0 h 332"/>
+                  <a:gd name="T6" fmla="*/ 15 w 423"/>
+                  <a:gd name="T7" fmla="*/ 166 h 332"/>
+                  <a:gd name="T8" fmla="*/ 423 w 423"/>
+                  <a:gd name="T9" fmla="*/ 166 h 332"/>
+                </a:gdLst>
+                <a:ahLst/>
+                <a:cxnLst>
+                  <a:cxn ang="0">
+                    <a:pos x="T0" y="T1"/>
+                  </a:cxn>
+                  <a:cxn ang="0">
+                    <a:pos x="T2" y="T3"/>
+                  </a:cxn>
+                  <a:cxn ang="0">
+                    <a:pos x="T4" y="T5"/>
+                  </a:cxn>
+                  <a:cxn ang="0">
+                    <a:pos x="T6" y="T7"/>
+                  </a:cxn>
+                  <a:cxn ang="0">
+                    <a:pos x="T8" y="T9"/>
+                  </a:cxn>
+                </a:cxnLst>
+                <a:rect l="0" t="0" r="r" b="b"/>
+                <a:pathLst>
+                  <a:path w="423" h="332">
+                    <a:moveTo>
+                      <a:pt x="159" y="332"/>
+                    </a:moveTo>
+                    <a:lnTo>
+                      <a:pt x="0" y="166"/>
+                    </a:lnTo>
+                    <a:lnTo>
+                      <a:pt x="159" y="0"/>
+                    </a:lnTo>
+                    <a:moveTo>
+                      <a:pt x="15" y="166"/>
+                    </a:moveTo>
+                    <a:lnTo>
+                      <a:pt x="423" y="166"/>
+                    </a:lnTo>
+                  </a:path>
+                </a:pathLst>
+              </a:custGeom>
+              <a:noFill/>
+              <a:ln w="6350" cap="sq">
+                <a:solidFill>
+                  <a:srgbClr val="808080"/>
+                </a:solidFill>
+                <a:prstDash val="solid"/>
+                <a:miter lim="800000"/>
+                <a:headEnd/>
+                <a:tailEnd/>
+              </a:ln>
+              <a:extLst>
+                <a:ext uri="{909E8E84-426E-40DD-AFC4-6F175D3DCCD1}">
+                  <a14:hiddenFill xmlns:a14="http://schemas.microsoft.com/office/drawing/2010/main">
+                    <a:solidFill>
+                      <a:srgbClr val="FFFFFF"/>
+                    </a:solidFill>
+                  </a14:hiddenFill>
+                </a:ext>
+              </a:extLst>
+            </p:spPr>
+            <p:txBody>
+              <a:bodyPr vert="horz" wrap="square" lIns="91440" tIns="45720" rIns="91440" bIns="45720" numCol="1" anchor="t" anchorCtr="0" compatLnSpc="1">
+                <a:prstTxWarp prst="textNoShape">
+                  <a:avLst/>
+                </a:prstTxWarp>
+              </a:bodyPr>
+              <a:lstStyle>
+                <a:defPPr>
+                  <a:defRPr lang="en-US"/>
+                </a:defPPr>
+                <a:lvl1pPr marL="0" algn="l" defTabSz="914400" rtl="0" eaLnBrk="1" latinLnBrk="0" hangingPunct="1">
+                  <a:defRPr sz="1800" kern="1200">
+                    <a:solidFill>
+                      <a:schemeClr val="tx1"/>
+                    </a:solidFill>
+                    <a:latin typeface="+mn-lt"/>
+                    <a:ea typeface="+mn-ea"/>
+                    <a:cs typeface="+mn-cs"/>
+                  </a:defRPr>
+                </a:lvl1pPr>
+                <a:lvl2pPr marL="457200" algn="l" defTabSz="914400" rtl="0" eaLnBrk="1" latinLnBrk="0" hangingPunct="1">
+                  <a:defRPr sz="1800" kern="1200">
+                    <a:solidFill>
+                      <a:schemeClr val="tx1"/>
+                    </a:solidFill>
+                    <a:latin typeface="+mn-lt"/>
+                    <a:ea typeface="+mn-ea"/>
+                    <a:cs typeface="+mn-cs"/>
+                  </a:defRPr>
+                </a:lvl2pPr>
+                <a:lvl3pPr marL="914400" algn="l" defTabSz="914400" rtl="0" eaLnBrk="1" latinLnBrk="0" hangingPunct="1">
+                  <a:defRPr sz="1800" kern="1200">
+                    <a:solidFill>
+                      <a:schemeClr val="tx1"/>
+                    </a:solidFill>
+                    <a:latin typeface="+mn-lt"/>
+                    <a:ea typeface="+mn-ea"/>
+                    <a:cs typeface="+mn-cs"/>
+                  </a:defRPr>
+                </a:lvl3pPr>
+                <a:lvl4pPr marL="1371600" algn="l" defTabSz="914400" rtl="0" eaLnBrk="1" latinLnBrk="0" hangingPunct="1">
+                  <a:defRPr sz="1800" kern="1200">
+                    <a:solidFill>
+                      <a:schemeClr val="tx1"/>
+                    </a:solidFill>
+                    <a:latin typeface="+mn-lt"/>
+                    <a:ea typeface="+mn-ea"/>
+                    <a:cs typeface="+mn-cs"/>
+                  </a:defRPr>
+                </a:lvl4pPr>
+                <a:lvl5pPr marL="1828800" algn="l" defTabSz="914400" rtl="0" eaLnBrk="1" latinLnBrk="0" hangingPunct="1">
+                  <a:defRPr sz="1800" kern="1200">
+                    <a:solidFill>
+                      <a:schemeClr val="tx1"/>
+                    </a:solidFill>
+                    <a:latin typeface="+mn-lt"/>
+                    <a:ea typeface="+mn-ea"/>
+                    <a:cs typeface="+mn-cs"/>
+                  </a:defRPr>
+                </a:lvl5pPr>
+                <a:lvl6pPr marL="2286000" algn="l" defTabSz="914400" rtl="0" eaLnBrk="1" latinLnBrk="0" hangingPunct="1">
+                  <a:defRPr sz="1800" kern="1200">
+                    <a:solidFill>
+                      <a:schemeClr val="tx1"/>
+                    </a:solidFill>
+                    <a:latin typeface="+mn-lt"/>
+                    <a:ea typeface="+mn-ea"/>
+                    <a:cs typeface="+mn-cs"/>
+                  </a:defRPr>
+                </a:lvl6pPr>
+                <a:lvl7pPr marL="2743200" algn="l" defTabSz="914400" rtl="0" eaLnBrk="1" latinLnBrk="0" hangingPunct="1">
+                  <a:defRPr sz="1800" kern="1200">
+                    <a:solidFill>
+                      <a:schemeClr val="tx1"/>
+                    </a:solidFill>
+                    <a:latin typeface="+mn-lt"/>
+                    <a:ea typeface="+mn-ea"/>
+                    <a:cs typeface="+mn-cs"/>
+                  </a:defRPr>
+                </a:lvl7pPr>
+                <a:lvl8pPr marL="3200400" algn="l" defTabSz="914400" rtl="0" eaLnBrk="1" latinLnBrk="0" hangingPunct="1">
+                  <a:defRPr sz="1800" kern="1200">
+                    <a:solidFill>
+                      <a:schemeClr val="tx1"/>
+                    </a:solidFill>
+                    <a:latin typeface="+mn-lt"/>
+                    <a:ea typeface="+mn-ea"/>
+                    <a:cs typeface="+mn-cs"/>
+                  </a:defRPr>
+                </a:lvl8pPr>
+                <a:lvl9pPr marL="3657600" algn="l" defTabSz="914400" rtl="0" eaLnBrk="1" latinLnBrk="0" hangingPunct="1">
+                  <a:defRPr sz="1800" kern="1200">
+                    <a:solidFill>
+                      <a:schemeClr val="tx1"/>
+                    </a:solidFill>
+                    <a:latin typeface="+mn-lt"/>
+                    <a:ea typeface="+mn-ea"/>
+                    <a:cs typeface="+mn-cs"/>
+                  </a:defRPr>
+                </a:lvl9pPr>
+              </a:lstStyle>
+              <a:p>
+                <a:endParaRPr lang="en-US">
+                  <a:solidFill>
+                    <a:srgbClr val="5F5F5F"/>
+                  </a:solidFill>
+                  <a:latin typeface="Segoe UI" panose="020B0502040204020203" pitchFamily="34" charset="0"/>
+                  <a:cs typeface="Segoe UI" panose="020B0502040204020203" pitchFamily="34" charset="0"/>
+                </a:endParaRPr>
+              </a:p>
+            </p:txBody>
+          </p:sp>
+          <p:sp>
+            <p:nvSpPr>
+              <p:cNvPr id="13" name="Forward Button" descr="&lt;SmartSettings&gt;&lt;SmartResize anchorLeft=&quot;Absolute&quot; anchorTop=&quot;Absolute&quot; anchorRight=&quot;None&quot; anchorBottom=&quot;None&quot; /&gt;&lt;/SmartSettings&gt;">
+                <a:extLst>
+                  <a:ext uri="{FF2B5EF4-FFF2-40B4-BE49-F238E27FC236}">
+                    <a16:creationId xmlns:a16="http://schemas.microsoft.com/office/drawing/2014/main" id="{3380B1A6-C917-46CA-BB78-3860E6FCD957}"/>
+                  </a:ext>
+                </a:extLst>
+              </p:cNvPr>
+              <p:cNvSpPr>
+                <a:spLocks noChangeAspect="1" noEditPoints="1"/>
+              </p:cNvSpPr>
+              <p:nvPr>
+                <p:custDataLst>
+                  <p:tags r:id="rId9"/>
+                </p:custDataLst>
+              </p:nvPr>
+            </p:nvSpPr>
+            <p:spPr bwMode="auto">
+              <a:xfrm>
+                <a:off x="881370" y="1467054"/>
+                <a:ext cx="118565" cy="81792"/>
+              </a:xfrm>
+              <a:custGeom>
+                <a:avLst/>
+                <a:gdLst>
+                  <a:gd name="T0" fmla="*/ 265 w 423"/>
+                  <a:gd name="T1" fmla="*/ 0 h 332"/>
+                  <a:gd name="T2" fmla="*/ 423 w 423"/>
+                  <a:gd name="T3" fmla="*/ 166 h 332"/>
+                  <a:gd name="T4" fmla="*/ 265 w 423"/>
+                  <a:gd name="T5" fmla="*/ 332 h 332"/>
+                  <a:gd name="T6" fmla="*/ 408 w 423"/>
+                  <a:gd name="T7" fmla="*/ 166 h 332"/>
+                  <a:gd name="T8" fmla="*/ 0 w 423"/>
+                  <a:gd name="T9" fmla="*/ 166 h 332"/>
+                </a:gdLst>
+                <a:ahLst/>
+                <a:cxnLst>
+                  <a:cxn ang="0">
+                    <a:pos x="T0" y="T1"/>
+                  </a:cxn>
+                  <a:cxn ang="0">
+                    <a:pos x="T2" y="T3"/>
+                  </a:cxn>
+                  <a:cxn ang="0">
+                    <a:pos x="T4" y="T5"/>
+                  </a:cxn>
+                  <a:cxn ang="0">
+                    <a:pos x="T6" y="T7"/>
+                  </a:cxn>
+                  <a:cxn ang="0">
+                    <a:pos x="T8" y="T9"/>
+                  </a:cxn>
+                </a:cxnLst>
+                <a:rect l="0" t="0" r="r" b="b"/>
+                <a:pathLst>
+                  <a:path w="423" h="332">
+                    <a:moveTo>
+                      <a:pt x="265" y="0"/>
+                    </a:moveTo>
+                    <a:lnTo>
+                      <a:pt x="423" y="166"/>
+                    </a:lnTo>
+                    <a:lnTo>
+                      <a:pt x="265" y="332"/>
+                    </a:lnTo>
+                    <a:moveTo>
+                      <a:pt x="408" y="166"/>
+                    </a:moveTo>
+                    <a:lnTo>
+                      <a:pt x="0" y="166"/>
+                    </a:lnTo>
+                  </a:path>
+                </a:pathLst>
+              </a:custGeom>
+              <a:noFill/>
+              <a:ln w="6350" cap="sq">
+                <a:solidFill>
+                  <a:srgbClr val="808080"/>
+                </a:solidFill>
+                <a:prstDash val="solid"/>
+                <a:miter lim="800000"/>
+                <a:headEnd/>
+                <a:tailEnd/>
+              </a:ln>
+              <a:extLst>
+                <a:ext uri="{909E8E84-426E-40DD-AFC4-6F175D3DCCD1}">
+                  <a14:hiddenFill xmlns:a14="http://schemas.microsoft.com/office/drawing/2010/main">
+                    <a:solidFill>
+                      <a:srgbClr val="FFFFFF"/>
+                    </a:solidFill>
+                  </a14:hiddenFill>
+                </a:ext>
+              </a:extLst>
+            </p:spPr>
+            <p:txBody>
+              <a:bodyPr vert="horz" wrap="square" lIns="91440" tIns="45720" rIns="91440" bIns="45720" numCol="1" anchor="t" anchorCtr="0" compatLnSpc="1">
+                <a:prstTxWarp prst="textNoShape">
+                  <a:avLst/>
+                </a:prstTxWarp>
+              </a:bodyPr>
+              <a:lstStyle>
+                <a:defPPr>
+                  <a:defRPr lang="en-US"/>
+                </a:defPPr>
+                <a:lvl1pPr marL="0" algn="l" defTabSz="914400" rtl="0" eaLnBrk="1" latinLnBrk="0" hangingPunct="1">
+                  <a:defRPr sz="1800" kern="1200">
+                    <a:solidFill>
+                      <a:schemeClr val="tx1"/>
+                    </a:solidFill>
+                    <a:latin typeface="+mn-lt"/>
+                    <a:ea typeface="+mn-ea"/>
+                    <a:cs typeface="+mn-cs"/>
+                  </a:defRPr>
+                </a:lvl1pPr>
+                <a:lvl2pPr marL="457200" algn="l" defTabSz="914400" rtl="0" eaLnBrk="1" latinLnBrk="0" hangingPunct="1">
+                  <a:defRPr sz="1800" kern="1200">
+                    <a:solidFill>
+                      <a:schemeClr val="tx1"/>
+                    </a:solidFill>
+                    <a:latin typeface="+mn-lt"/>
+                    <a:ea typeface="+mn-ea"/>
+                    <a:cs typeface="+mn-cs"/>
+                  </a:defRPr>
+                </a:lvl2pPr>
+                <a:lvl3pPr marL="914400" algn="l" defTabSz="914400" rtl="0" eaLnBrk="1" latinLnBrk="0" hangingPunct="1">
+                  <a:defRPr sz="1800" kern="1200">
+                    <a:solidFill>
+                      <a:schemeClr val="tx1"/>
+                    </a:solidFill>
+                    <a:latin typeface="+mn-lt"/>
+                    <a:ea typeface="+mn-ea"/>
+                    <a:cs typeface="+mn-cs"/>
+                  </a:defRPr>
+                </a:lvl3pPr>
+                <a:lvl4pPr marL="1371600" algn="l" defTabSz="914400" rtl="0" eaLnBrk="1" latinLnBrk="0" hangingPunct="1">
+                  <a:defRPr sz="1800" kern="1200">
+                    <a:solidFill>
+                      <a:schemeClr val="tx1"/>
+                    </a:solidFill>
+                    <a:latin typeface="+mn-lt"/>
+                    <a:ea typeface="+mn-ea"/>
+                    <a:cs typeface="+mn-cs"/>
+                  </a:defRPr>
+                </a:lvl4pPr>
+                <a:lvl5pPr marL="1828800" algn="l" defTabSz="914400" rtl="0" eaLnBrk="1" latinLnBrk="0" hangingPunct="1">
+                  <a:defRPr sz="1800" kern="1200">
+                    <a:solidFill>
+                      <a:schemeClr val="tx1"/>
+                    </a:solidFill>
+                    <a:latin typeface="+mn-lt"/>
+                    <a:ea typeface="+mn-ea"/>
+                    <a:cs typeface="+mn-cs"/>
+                  </a:defRPr>
+                </a:lvl5pPr>
+                <a:lvl6pPr marL="2286000" algn="l" defTabSz="914400" rtl="0" eaLnBrk="1" latinLnBrk="0" hangingPunct="1">
+                  <a:defRPr sz="1800" kern="1200">
+                    <a:solidFill>
+                      <a:schemeClr val="tx1"/>
+                    </a:solidFill>
+                    <a:latin typeface="+mn-lt"/>
+                    <a:ea typeface="+mn-ea"/>
+                    <a:cs typeface="+mn-cs"/>
+                  </a:defRPr>
+                </a:lvl6pPr>
+                <a:lvl7pPr marL="2743200" algn="l" defTabSz="914400" rtl="0" eaLnBrk="1" latinLnBrk="0" hangingPunct="1">
+                  <a:defRPr sz="1800" kern="1200">
+                    <a:solidFill>
+                      <a:schemeClr val="tx1"/>
+                    </a:solidFill>
+                    <a:latin typeface="+mn-lt"/>
+                    <a:ea typeface="+mn-ea"/>
+                    <a:cs typeface="+mn-cs"/>
+                  </a:defRPr>
+                </a:lvl7pPr>
+                <a:lvl8pPr marL="3200400" algn="l" defTabSz="914400" rtl="0" eaLnBrk="1" latinLnBrk="0" hangingPunct="1">
+                  <a:defRPr sz="1800" kern="1200">
+                    <a:solidFill>
+                      <a:schemeClr val="tx1"/>
+                    </a:solidFill>
+                    <a:latin typeface="+mn-lt"/>
+                    <a:ea typeface="+mn-ea"/>
+                    <a:cs typeface="+mn-cs"/>
+                  </a:defRPr>
+                </a:lvl8pPr>
+                <a:lvl9pPr marL="3657600" algn="l" defTabSz="914400" rtl="0" eaLnBrk="1" latinLnBrk="0" hangingPunct="1">
+                  <a:defRPr sz="1800" kern="1200">
+                    <a:solidFill>
+                      <a:schemeClr val="tx1"/>
+                    </a:solidFill>
+                    <a:latin typeface="+mn-lt"/>
+                    <a:ea typeface="+mn-ea"/>
+                    <a:cs typeface="+mn-cs"/>
+                  </a:defRPr>
+                </a:lvl9pPr>
+              </a:lstStyle>
+              <a:p>
+                <a:endParaRPr lang="en-US">
+                  <a:solidFill>
+                    <a:srgbClr val="5F5F5F"/>
+                  </a:solidFill>
+                  <a:latin typeface="Segoe UI" panose="020B0502040204020203" pitchFamily="34" charset="0"/>
+                  <a:cs typeface="Segoe UI" panose="020B0502040204020203" pitchFamily="34" charset="0"/>
+                </a:endParaRPr>
+              </a:p>
+            </p:txBody>
+          </p:sp>
+          <p:sp>
+            <p:nvSpPr>
+              <p:cNvPr id="14" name="Reload Button" descr="&lt;SmartSettings&gt;&lt;SmartResize anchorLeft=&quot;Absolute&quot; anchorTop=&quot;Absolute&quot; anchorRight=&quot;None&quot; anchorBottom=&quot;None&quot; /&gt;&lt;/SmartSettings&gt;">
+                <a:extLst>
+                  <a:ext uri="{FF2B5EF4-FFF2-40B4-BE49-F238E27FC236}">
+                    <a16:creationId xmlns:a16="http://schemas.microsoft.com/office/drawing/2014/main" id="{F8B5F53F-5916-4D77-AA23-BB3E30C5BAAE}"/>
+                  </a:ext>
+                </a:extLst>
+              </p:cNvPr>
+              <p:cNvSpPr>
+                <a:spLocks noChangeAspect="1" noEditPoints="1"/>
+              </p:cNvSpPr>
+              <p:nvPr>
+                <p:custDataLst>
+                  <p:tags r:id="rId10"/>
+                </p:custDataLst>
+              </p:nvPr>
+            </p:nvSpPr>
+            <p:spPr bwMode="auto">
+              <a:xfrm>
+                <a:off x="1069098" y="1449296"/>
+                <a:ext cx="123505" cy="117307"/>
+              </a:xfrm>
+              <a:custGeom>
+                <a:avLst/>
+                <a:gdLst>
+                  <a:gd name="T0" fmla="*/ 441 w 441"/>
+                  <a:gd name="T1" fmla="*/ 7 h 474"/>
+                  <a:gd name="T2" fmla="*/ 441 w 441"/>
+                  <a:gd name="T3" fmla="*/ 144 h 474"/>
+                  <a:gd name="T4" fmla="*/ 296 w 441"/>
+                  <a:gd name="T5" fmla="*/ 144 h 474"/>
+                  <a:gd name="T6" fmla="*/ 438 w 441"/>
+                  <a:gd name="T7" fmla="*/ 309 h 474"/>
+                  <a:gd name="T8" fmla="*/ 166 w 441"/>
+                  <a:gd name="T9" fmla="*/ 434 h 474"/>
+                  <a:gd name="T10" fmla="*/ 41 w 441"/>
+                  <a:gd name="T11" fmla="*/ 162 h 474"/>
+                  <a:gd name="T12" fmla="*/ 313 w 441"/>
+                  <a:gd name="T13" fmla="*/ 37 h 474"/>
+                  <a:gd name="T14" fmla="*/ 428 w 441"/>
+                  <a:gd name="T15" fmla="*/ 139 h 474"/>
+                </a:gdLst>
+                <a:ahLst/>
+                <a:cxnLst>
+                  <a:cxn ang="0">
+                    <a:pos x="T0" y="T1"/>
+                  </a:cxn>
+                  <a:cxn ang="0">
+                    <a:pos x="T2" y="T3"/>
+                  </a:cxn>
+                  <a:cxn ang="0">
+                    <a:pos x="T4" y="T5"/>
+                  </a:cxn>
+                  <a:cxn ang="0">
+                    <a:pos x="T6" y="T7"/>
+                  </a:cxn>
+                  <a:cxn ang="0">
+                    <a:pos x="T8" y="T9"/>
+                  </a:cxn>
+                  <a:cxn ang="0">
+                    <a:pos x="T10" y="T11"/>
+                  </a:cxn>
+                  <a:cxn ang="0">
+                    <a:pos x="T12" y="T13"/>
+                  </a:cxn>
+                  <a:cxn ang="0">
+                    <a:pos x="T14" y="T15"/>
+                  </a:cxn>
+                </a:cxnLst>
+                <a:rect l="0" t="0" r="r" b="b"/>
+                <a:pathLst>
+                  <a:path w="441" h="474">
+                    <a:moveTo>
+                      <a:pt x="441" y="7"/>
+                    </a:moveTo>
+                    <a:lnTo>
+                      <a:pt x="441" y="144"/>
+                    </a:lnTo>
+                    <a:lnTo>
+                      <a:pt x="296" y="144"/>
+                    </a:lnTo>
+                    <a:moveTo>
+                      <a:pt x="438" y="309"/>
+                    </a:moveTo>
+                    <a:cubicBezTo>
+                      <a:pt x="397" y="418"/>
+                      <a:pt x="276" y="474"/>
+                      <a:pt x="166" y="434"/>
+                    </a:cubicBezTo>
+                    <a:cubicBezTo>
+                      <a:pt x="56" y="393"/>
+                      <a:pt x="0" y="271"/>
+                      <a:pt x="41" y="162"/>
+                    </a:cubicBezTo>
+                    <a:cubicBezTo>
+                      <a:pt x="82" y="52"/>
+                      <a:pt x="202" y="0"/>
+                      <a:pt x="313" y="37"/>
+                    </a:cubicBezTo>
+                    <a:cubicBezTo>
+                      <a:pt x="357" y="51"/>
+                      <a:pt x="398" y="91"/>
+                      <a:pt x="428" y="139"/>
+                    </a:cubicBezTo>
+                  </a:path>
+                </a:pathLst>
+              </a:custGeom>
+              <a:noFill/>
+              <a:ln w="6350" cap="flat">
+                <a:solidFill>
+                  <a:srgbClr val="808080"/>
+                </a:solidFill>
+                <a:prstDash val="solid"/>
+                <a:miter lim="800000"/>
+                <a:headEnd/>
+                <a:tailEnd/>
+              </a:ln>
+              <a:extLst>
+                <a:ext uri="{909E8E84-426E-40DD-AFC4-6F175D3DCCD1}">
+                  <a14:hiddenFill xmlns:a14="http://schemas.microsoft.com/office/drawing/2010/main">
+                    <a:solidFill>
+                      <a:srgbClr val="FFFFFF"/>
+                    </a:solidFill>
+                  </a14:hiddenFill>
+                </a:ext>
+              </a:extLst>
+            </p:spPr>
+            <p:txBody>
+              <a:bodyPr vert="horz" wrap="square" lIns="91440" tIns="45720" rIns="91440" bIns="45720" numCol="1" anchor="t" anchorCtr="0" compatLnSpc="1">
+                <a:prstTxWarp prst="textNoShape">
+                  <a:avLst/>
+                </a:prstTxWarp>
+              </a:bodyPr>
+              <a:lstStyle>
+                <a:defPPr>
+                  <a:defRPr lang="en-US"/>
+                </a:defPPr>
+                <a:lvl1pPr marL="0" algn="l" defTabSz="914400" rtl="0" eaLnBrk="1" latinLnBrk="0" hangingPunct="1">
+                  <a:defRPr sz="1800" kern="1200">
+                    <a:solidFill>
+                      <a:schemeClr val="tx1"/>
+                    </a:solidFill>
+                    <a:latin typeface="+mn-lt"/>
+                    <a:ea typeface="+mn-ea"/>
+                    <a:cs typeface="+mn-cs"/>
+                  </a:defRPr>
+                </a:lvl1pPr>
+                <a:lvl2pPr marL="457200" algn="l" defTabSz="914400" rtl="0" eaLnBrk="1" latinLnBrk="0" hangingPunct="1">
+                  <a:defRPr sz="1800" kern="1200">
+                    <a:solidFill>
+                      <a:schemeClr val="tx1"/>
+                    </a:solidFill>
+                    <a:latin typeface="+mn-lt"/>
+                    <a:ea typeface="+mn-ea"/>
+                    <a:cs typeface="+mn-cs"/>
+                  </a:defRPr>
+                </a:lvl2pPr>
+                <a:lvl3pPr marL="914400" algn="l" defTabSz="914400" rtl="0" eaLnBrk="1" latinLnBrk="0" hangingPunct="1">
+                  <a:defRPr sz="1800" kern="1200">
+                    <a:solidFill>
+                      <a:schemeClr val="tx1"/>
+                    </a:solidFill>
+                    <a:latin typeface="+mn-lt"/>
+                    <a:ea typeface="+mn-ea"/>
+                    <a:cs typeface="+mn-cs"/>
+                  </a:defRPr>
+                </a:lvl3pPr>
+                <a:lvl4pPr marL="1371600" algn="l" defTabSz="914400" rtl="0" eaLnBrk="1" latinLnBrk="0" hangingPunct="1">
+                  <a:defRPr sz="1800" kern="1200">
+                    <a:solidFill>
+                      <a:schemeClr val="tx1"/>
+                    </a:solidFill>
+                    <a:latin typeface="+mn-lt"/>
+                    <a:ea typeface="+mn-ea"/>
+                    <a:cs typeface="+mn-cs"/>
+                  </a:defRPr>
+                </a:lvl4pPr>
+                <a:lvl5pPr marL="1828800" algn="l" defTabSz="914400" rtl="0" eaLnBrk="1" latinLnBrk="0" hangingPunct="1">
+                  <a:defRPr sz="1800" kern="1200">
+                    <a:solidFill>
+                      <a:schemeClr val="tx1"/>
+                    </a:solidFill>
+                    <a:latin typeface="+mn-lt"/>
+                    <a:ea typeface="+mn-ea"/>
+                    <a:cs typeface="+mn-cs"/>
+                  </a:defRPr>
+                </a:lvl5pPr>
+                <a:lvl6pPr marL="2286000" algn="l" defTabSz="914400" rtl="0" eaLnBrk="1" latinLnBrk="0" hangingPunct="1">
+                  <a:defRPr sz="1800" kern="1200">
+                    <a:solidFill>
+                      <a:schemeClr val="tx1"/>
+                    </a:solidFill>
+                    <a:latin typeface="+mn-lt"/>
+                    <a:ea typeface="+mn-ea"/>
+                    <a:cs typeface="+mn-cs"/>
+                  </a:defRPr>
+                </a:lvl6pPr>
+                <a:lvl7pPr marL="2743200" algn="l" defTabSz="914400" rtl="0" eaLnBrk="1" latinLnBrk="0" hangingPunct="1">
+                  <a:defRPr sz="1800" kern="1200">
+                    <a:solidFill>
+                      <a:schemeClr val="tx1"/>
+                    </a:solidFill>
+                    <a:latin typeface="+mn-lt"/>
+                    <a:ea typeface="+mn-ea"/>
+                    <a:cs typeface="+mn-cs"/>
+                  </a:defRPr>
+                </a:lvl7pPr>
+                <a:lvl8pPr marL="3200400" algn="l" defTabSz="914400" rtl="0" eaLnBrk="1" latinLnBrk="0" hangingPunct="1">
+                  <a:defRPr sz="1800" kern="1200">
+                    <a:solidFill>
+                      <a:schemeClr val="tx1"/>
+                    </a:solidFill>
+                    <a:latin typeface="+mn-lt"/>
+                    <a:ea typeface="+mn-ea"/>
+                    <a:cs typeface="+mn-cs"/>
+                  </a:defRPr>
+                </a:lvl8pPr>
+                <a:lvl9pPr marL="3657600" algn="l" defTabSz="914400" rtl="0" eaLnBrk="1" latinLnBrk="0" hangingPunct="1">
+                  <a:defRPr sz="1800" kern="1200">
+                    <a:solidFill>
+                      <a:schemeClr val="tx1"/>
+                    </a:solidFill>
+                    <a:latin typeface="+mn-lt"/>
+                    <a:ea typeface="+mn-ea"/>
+                    <a:cs typeface="+mn-cs"/>
+                  </a:defRPr>
+                </a:lvl9pPr>
+              </a:lstStyle>
+              <a:p>
+                <a:endParaRPr lang="en-US">
+                  <a:solidFill>
+                    <a:srgbClr val="5F5F5F"/>
+                  </a:solidFill>
+                  <a:latin typeface="Segoe UI" panose="020B0502040204020203" pitchFamily="34" charset="0"/>
+                  <a:cs typeface="Segoe UI" panose="020B0502040204020203" pitchFamily="34" charset="0"/>
+                </a:endParaRPr>
+              </a:p>
+            </p:txBody>
+          </p:sp>
+        </p:grpSp>
+      </p:grpSp>
+      <p:grpSp>
+        <p:nvGrpSpPr>
+          <p:cNvPr id="16" name="그룹 15">
+            <a:extLst>
+              <a:ext uri="{FF2B5EF4-FFF2-40B4-BE49-F238E27FC236}">
+                <a16:creationId xmlns:a16="http://schemas.microsoft.com/office/drawing/2014/main" id="{0A19EBCA-9192-4F64-AA65-0C818899B032}"/>
+              </a:ext>
+            </a:extLst>
+          </p:cNvPr>
+          <p:cNvGrpSpPr/>
+          <p:nvPr/>
+        </p:nvGrpSpPr>
+        <p:grpSpPr>
+          <a:xfrm>
+            <a:off x="3544277" y="2315632"/>
+            <a:ext cx="5384800" cy="4078514"/>
+            <a:chOff x="3439886" y="2017486"/>
+            <a:chExt cx="5384800" cy="4078514"/>
+          </a:xfrm>
+        </p:grpSpPr>
+        <p:pic>
+          <p:nvPicPr>
+            <p:cNvPr id="3" name="그래픽 2" descr="지구본: 아시아 및 오스트레일리아  단색으로 채워진">
+              <a:extLst>
+                <a:ext uri="{FF2B5EF4-FFF2-40B4-BE49-F238E27FC236}">
+                  <a16:creationId xmlns:a16="http://schemas.microsoft.com/office/drawing/2014/main" id="{CACCC4EF-D84E-4174-8628-35A113DD68BC}"/>
+                </a:ext>
+              </a:extLst>
+            </p:cNvPr>
+            <p:cNvPicPr>
+              <a:picLocks noChangeAspect="1"/>
+            </p:cNvPicPr>
+            <p:nvPr/>
+          </p:nvPicPr>
+          <p:blipFill>
+            <a:blip r:embed="rId12">
+              <a:extLst>
+                <a:ext uri="{28A0092B-C50C-407E-A947-70E740481C1C}">
+                  <a14:useLocalDpi xmlns:a14="http://schemas.microsoft.com/office/drawing/2010/main" val="0"/>
+                </a:ext>
+                <a:ext uri="{96DAC541-7B7A-43D3-8B79-37D633B846F1}">
+                  <asvg:svgBlip xmlns:asvg="http://schemas.microsoft.com/office/drawing/2016/SVG/main" r:embed="rId13"/>
+                </a:ext>
+              </a:extLst>
+            </a:blip>
+            <a:stretch>
+              <a:fillRect/>
+            </a:stretch>
+          </p:blipFill>
+          <p:spPr>
+            <a:xfrm>
+              <a:off x="4539343" y="2463800"/>
+              <a:ext cx="3185886" cy="3185886"/>
+            </a:xfrm>
+            <a:prstGeom prst="rect">
+              <a:avLst/>
+            </a:prstGeom>
+          </p:spPr>
+        </p:pic>
+        <p:sp>
+          <p:nvSpPr>
+            <p:cNvPr id="15" name="직사각형 14">
+              <a:extLst>
+                <a:ext uri="{FF2B5EF4-FFF2-40B4-BE49-F238E27FC236}">
+                  <a16:creationId xmlns:a16="http://schemas.microsoft.com/office/drawing/2014/main" id="{BE8265D0-908D-4AB7-9AE8-C59D580F2DE8}"/>
+                </a:ext>
+              </a:extLst>
+            </p:cNvPr>
+            <p:cNvSpPr/>
+            <p:nvPr/>
+          </p:nvSpPr>
+          <p:spPr>
+            <a:xfrm>
+              <a:off x="3439886" y="2017486"/>
+              <a:ext cx="5384800" cy="4078514"/>
+            </a:xfrm>
+            <a:prstGeom prst="rect">
+              <a:avLst/>
+            </a:prstGeom>
+            <a:noFill/>
+          </p:spPr>
+          <p:style>
+            <a:lnRef idx="2">
+              <a:schemeClr val="accent1">
+                <a:shade val="50000"/>
+              </a:schemeClr>
+            </a:lnRef>
+            <a:fillRef idx="1">
+              <a:schemeClr val="accent1"/>
+            </a:fillRef>
+            <a:effectRef idx="0">
+              <a:schemeClr val="accent1"/>
+            </a:effectRef>
+            <a:fontRef idx="minor">
+              <a:schemeClr val="lt1"/>
+            </a:fontRef>
+          </p:style>
+          <p:txBody>
+            <a:bodyPr rtlCol="0" anchor="ctr"/>
+            <a:lstStyle/>
+            <a:p>
+              <a:pPr algn="ctr"/>
+              <a:endParaRPr lang="ko-KR" altLang="en-US"/>
+            </a:p>
+          </p:txBody>
+        </p:sp>
+      </p:grpSp>
+      <p:sp>
+        <p:nvSpPr>
+          <p:cNvPr id="17" name="직사각형 16">
+            <a:extLst>
+              <a:ext uri="{FF2B5EF4-FFF2-40B4-BE49-F238E27FC236}">
+                <a16:creationId xmlns:a16="http://schemas.microsoft.com/office/drawing/2014/main" id="{43127543-9E39-461E-867B-8FCC38B62E28}"/>
+              </a:ext>
+            </a:extLst>
+          </p:cNvPr>
+          <p:cNvSpPr/>
+          <p:nvPr/>
+        </p:nvSpPr>
+        <p:spPr>
+          <a:xfrm>
+            <a:off x="4269991" y="1305140"/>
+            <a:ext cx="3933371" cy="260357"/>
+          </a:xfrm>
+          <a:prstGeom prst="rect">
+            <a:avLst/>
+          </a:prstGeom>
+          <a:noFill/>
+        </p:spPr>
+        <p:style>
+          <a:lnRef idx="2">
+            <a:schemeClr val="accent1">
+              <a:shade val="50000"/>
+            </a:schemeClr>
+          </a:lnRef>
+          <a:fillRef idx="1">
+            <a:schemeClr val="accent1"/>
+          </a:fillRef>
+          <a:effectRef idx="0">
+            <a:schemeClr val="accent1"/>
+          </a:effectRef>
+          <a:fontRef idx="minor">
+            <a:schemeClr val="lt1"/>
+          </a:fontRef>
+        </p:style>
+        <p:txBody>
+          <a:bodyPr rtlCol="0" anchor="ctr"/>
+          <a:lstStyle/>
+          <a:p>
+            <a:pPr algn="ctr"/>
+            <a:endParaRPr lang="ko-KR" altLang="en-US"/>
+          </a:p>
+        </p:txBody>
+      </p:sp>
+    </p:spTree>
+    <p:extLst>
+      <p:ext uri="{BB962C8B-B14F-4D97-AF65-F5344CB8AC3E}">
+        <p14:creationId xmlns:p14="http://schemas.microsoft.com/office/powerpoint/2010/main" val="2034771755"/>
+      </p:ext>
+    </p:extLst>
+  </p:cSld>
+  <p:clrMapOvr>
+    <a:masterClrMapping/>
+  </p:clrMapOvr>
+</p:sld>
+</file>
+
 <file path=ppt/tags/tag1.xml><?xml version="1.0" encoding="utf-8"?>
 <p:tagLst xmlns:a="http://schemas.openxmlformats.org/drawingml/2006/main" xmlns:r="http://schemas.openxmlformats.org/officeDocument/2006/relationships" xmlns:p="http://schemas.openxmlformats.org/presentationml/2006/main">
   <p:tag name="SMARTSETTINGSHASH" val="PWOa7bLCMN/NfWse0OkDrDXWtXjrMvC+/KEnGxnzoq0="/>
@@ -7136,9 +9178,69 @@
 </p:tagLst>
 </file>
 
+<file path=ppt/tags/tag23.xml><?xml version="1.0" encoding="utf-8"?>
+<p:tagLst xmlns:a="http://schemas.openxmlformats.org/drawingml/2006/main" xmlns:r="http://schemas.openxmlformats.org/officeDocument/2006/relationships" xmlns:p="http://schemas.openxmlformats.org/presentationml/2006/main">
+  <p:tag name="SMARTSETTINGSHASH" val="PWOa7bLCMN/NfWse0OkDrDXWtXjrMvC+/KEnGxnzoq0="/>
+</p:tagLst>
+</file>
+
+<file path=ppt/tags/tag24.xml><?xml version="1.0" encoding="utf-8"?>
+<p:tagLst xmlns:a="http://schemas.openxmlformats.org/drawingml/2006/main" xmlns:r="http://schemas.openxmlformats.org/officeDocument/2006/relationships" xmlns:p="http://schemas.openxmlformats.org/presentationml/2006/main">
+  <p:tag name="SMARTSETTINGSHASH" val="xZU/W0IqlvXPkJ37/hSWg5jSIFh0KZmI7sT1syyiYH8="/>
+</p:tagLst>
+</file>
+
+<file path=ppt/tags/tag25.xml><?xml version="1.0" encoding="utf-8"?>
+<p:tagLst xmlns:a="http://schemas.openxmlformats.org/drawingml/2006/main" xmlns:r="http://schemas.openxmlformats.org/officeDocument/2006/relationships" xmlns:p="http://schemas.openxmlformats.org/presentationml/2006/main">
+  <p:tag name="SMARTSETTINGSHASH" val="SB3bqgv5ghGJknk/m+/9EdPMDkanH9eNosaoBtCx42Q="/>
+</p:tagLst>
+</file>
+
+<file path=ppt/tags/tag26.xml><?xml version="1.0" encoding="utf-8"?>
+<p:tagLst xmlns:a="http://schemas.openxmlformats.org/drawingml/2006/main" xmlns:r="http://schemas.openxmlformats.org/officeDocument/2006/relationships" xmlns:p="http://schemas.openxmlformats.org/presentationml/2006/main">
+  <p:tag name="SMARTSETTINGSHASH" val="xscEFkRiZvbxLfN1YzQGPp4nKBgtuPrjp3QiTCcMWwM="/>
+</p:tagLst>
+</file>
+
+<file path=ppt/tags/tag27.xml><?xml version="1.0" encoding="utf-8"?>
+<p:tagLst xmlns:a="http://schemas.openxmlformats.org/drawingml/2006/main" xmlns:r="http://schemas.openxmlformats.org/officeDocument/2006/relationships" xmlns:p="http://schemas.openxmlformats.org/presentationml/2006/main">
+  <p:tag name="SMARTSETTINGSHASH" val="xscEFkRiZvbxLfN1YzQGPp4nKBgtuPrjp3QiTCcMWwM="/>
+</p:tagLst>
+</file>
+
+<file path=ppt/tags/tag28.xml><?xml version="1.0" encoding="utf-8"?>
+<p:tagLst xmlns:a="http://schemas.openxmlformats.org/drawingml/2006/main" xmlns:r="http://schemas.openxmlformats.org/officeDocument/2006/relationships" xmlns:p="http://schemas.openxmlformats.org/presentationml/2006/main">
+  <p:tag name="SMARTSETTINGSHASH" val="SB3bqgv5ghGJknk/m+/9EdPMDkanH9eNosaoBtCx42Q="/>
+</p:tagLst>
+</file>
+
+<file path=ppt/tags/tag29.xml><?xml version="1.0" encoding="utf-8"?>
+<p:tagLst xmlns:a="http://schemas.openxmlformats.org/drawingml/2006/main" xmlns:r="http://schemas.openxmlformats.org/officeDocument/2006/relationships" xmlns:p="http://schemas.openxmlformats.org/presentationml/2006/main">
+  <p:tag name="SMARTSETTINGSHASH" val="IDSg7uxH1Z/iSOkBSMZyie/SGkHlLE2okQSpqFhp1Ac="/>
+</p:tagLst>
+</file>
+
 <file path=ppt/tags/tag3.xml><?xml version="1.0" encoding="utf-8"?>
 <p:tagLst xmlns:a="http://schemas.openxmlformats.org/drawingml/2006/main" xmlns:r="http://schemas.openxmlformats.org/officeDocument/2006/relationships" xmlns:p="http://schemas.openxmlformats.org/presentationml/2006/main">
   <p:tag name="SMARTSETTINGSHASH" val="e2LyG275MKfvTp6do0okUjzBxgRCPw1IXGPe3BDSnOI="/>
+</p:tagLst>
+</file>
+
+<file path=ppt/tags/tag30.xml><?xml version="1.0" encoding="utf-8"?>
+<p:tagLst xmlns:a="http://schemas.openxmlformats.org/drawingml/2006/main" xmlns:r="http://schemas.openxmlformats.org/officeDocument/2006/relationships" xmlns:p="http://schemas.openxmlformats.org/presentationml/2006/main">
+  <p:tag name="SMARTSETTINGSHASH" val="IDSg7uxH1Z/iSOkBSMZyie/SGkHlLE2okQSpqFhp1Ac="/>
+</p:tagLst>
+</file>
+
+<file path=ppt/tags/tag31.xml><?xml version="1.0" encoding="utf-8"?>
+<p:tagLst xmlns:a="http://schemas.openxmlformats.org/drawingml/2006/main" xmlns:r="http://schemas.openxmlformats.org/officeDocument/2006/relationships" xmlns:p="http://schemas.openxmlformats.org/presentationml/2006/main">
+  <p:tag name="SMARTSETTINGSHASH" val="IDSg7uxH1Z/iSOkBSMZyie/SGkHlLE2okQSpqFhp1Ac="/>
+</p:tagLst>
+</file>
+
+<file path=ppt/tags/tag32.xml><?xml version="1.0" encoding="utf-8"?>
+<p:tagLst xmlns:a="http://schemas.openxmlformats.org/drawingml/2006/main" xmlns:r="http://schemas.openxmlformats.org/officeDocument/2006/relationships" xmlns:p="http://schemas.openxmlformats.org/presentationml/2006/main">
+  <p:tag name="SMARTSETTINGSHASH" val="IDSg7uxH1Z/iSOkBSMZyie/SGkHlLE2okQSpqFhp1Ac="/>
 </p:tagLst>
 </file>
 

</xml_diff>